<commit_message>
jest installation ppt Signed-off-by: tahir-masood1 <onlytahir@hotmail.com>
</commit_message>
<xml_diff>
--- a/React.pptx
+++ b/React.pptx
@@ -7,10 +7,10 @@
     <p:sldMasterId id="2147483707" r:id="rId3"/>
   </p:sldMasterIdLst>
   <p:notesMasterIdLst>
-    <p:notesMasterId r:id="rId43"/>
+    <p:notesMasterId r:id="rId44"/>
   </p:notesMasterIdLst>
   <p:handoutMasterIdLst>
-    <p:handoutMasterId r:id="rId44"/>
+    <p:handoutMasterId r:id="rId45"/>
   </p:handoutMasterIdLst>
   <p:sldIdLst>
     <p:sldId id="309" r:id="rId4"/>
@@ -49,9 +49,10 @@
     <p:sldId id="320" r:id="rId37"/>
     <p:sldId id="268" r:id="rId38"/>
     <p:sldId id="306" r:id="rId39"/>
-    <p:sldId id="319" r:id="rId40"/>
-    <p:sldId id="304" r:id="rId41"/>
-    <p:sldId id="311" r:id="rId42"/>
+    <p:sldId id="327" r:id="rId40"/>
+    <p:sldId id="319" r:id="rId41"/>
+    <p:sldId id="304" r:id="rId42"/>
+    <p:sldId id="311" r:id="rId43"/>
   </p:sldIdLst>
   <p:sldSz cx="12192000" cy="6858000"/>
   <p:notesSz cx="6858000" cy="9144000"/>
@@ -191,6 +192,7 @@
             <p14:sldId id="320"/>
             <p14:sldId id="268"/>
             <p14:sldId id="306"/>
+            <p14:sldId id="327"/>
             <p14:sldId id="319"/>
             <p14:sldId id="304"/>
             <p14:sldId id="311"/>
@@ -25640,6 +25642,344 @@
       </p:grpSpPr>
       <p:sp>
         <p:nvSpPr>
+          <p:cNvPr id="2" name="Title 1"/>
+          <p:cNvSpPr>
+            <a:spLocks noGrp="1"/>
+          </p:cNvSpPr>
+          <p:nvPr>
+            <p:ph type="title"/>
+          </p:nvPr>
+        </p:nvSpPr>
+        <p:spPr/>
+        <p:txBody>
+          <a:bodyPr/>
+          <a:lstStyle/>
+          <a:p>
+            <a:r>
+              <a:rPr lang="en-US" dirty="0"/>
+              <a:t>J</a:t>
+            </a:r>
+            <a:r>
+              <a:rPr lang="en-US" dirty="0" smtClean="0"/>
+              <a:t>est </a:t>
+            </a:r>
+            <a:r>
+              <a:rPr lang="en-US" dirty="0" smtClean="0"/>
+              <a:t>Installation</a:t>
+            </a:r>
+            <a:endParaRPr lang="en-US" dirty="0"/>
+          </a:p>
+        </p:txBody>
+      </p:sp>
+      <p:sp>
+        <p:nvSpPr>
+          <p:cNvPr id="3" name="Content Placeholder 2"/>
+          <p:cNvSpPr>
+            <a:spLocks noGrp="1"/>
+          </p:cNvSpPr>
+          <p:nvPr>
+            <p:ph idx="1"/>
+          </p:nvPr>
+        </p:nvSpPr>
+        <p:spPr>
+          <a:xfrm>
+            <a:off x="4724400" y="1949904"/>
+            <a:ext cx="10515600" cy="4351338"/>
+          </a:xfrm>
+        </p:spPr>
+        <p:txBody>
+          <a:bodyPr/>
+          <a:lstStyle/>
+          <a:p>
+            <a:pPr marL="0" indent="0">
+              <a:buNone/>
+            </a:pPr>
+            <a:r>
+              <a:rPr lang="en-US" dirty="0" smtClean="0"/>
+              <a:t>	</a:t>
+            </a:r>
+          </a:p>
+          <a:p>
+            <a:pPr marL="0" indent="0">
+              <a:buNone/>
+            </a:pPr>
+            <a:r>
+              <a:rPr lang="en-US" dirty="0" smtClean="0"/>
+              <a:t>				</a:t>
+            </a:r>
+            <a:r>
+              <a:rPr lang="en-US" dirty="0" smtClean="0"/>
+              <a:t>OR</a:t>
+            </a:r>
+            <a:endParaRPr lang="en-US" dirty="0"/>
+          </a:p>
+          <a:p>
+            <a:pPr marL="0" indent="0">
+              <a:buNone/>
+            </a:pPr>
+            <a:endParaRPr lang="en-US" dirty="0"/>
+          </a:p>
+          <a:p>
+            <a:pPr marL="0" indent="0">
+              <a:buNone/>
+            </a:pPr>
+            <a:r>
+              <a:rPr lang="en-US" sz="2000" b="1" dirty="0" smtClean="0"/>
+              <a:t>			</a:t>
+            </a:r>
+            <a:r>
+              <a:rPr lang="en-US" sz="2000" dirty="0" err="1"/>
+              <a:t>npm</a:t>
+            </a:r>
+            <a:r>
+              <a:rPr lang="en-US" sz="2000" dirty="0"/>
+              <a:t> install jest-cli --save-dev</a:t>
+            </a:r>
+            <a:endParaRPr lang="en-US" sz="2000" b="1" dirty="0"/>
+          </a:p>
+          <a:p>
+            <a:pPr marL="0" indent="0">
+              <a:buNone/>
+            </a:pPr>
+            <a:endParaRPr lang="en-US" sz="2000" dirty="0" smtClean="0"/>
+          </a:p>
+        </p:txBody>
+      </p:sp>
+      <p:sp>
+        <p:nvSpPr>
+          <p:cNvPr id="4" name="Footer Placeholder 3"/>
+          <p:cNvSpPr>
+            <a:spLocks noGrp="1"/>
+          </p:cNvSpPr>
+          <p:nvPr>
+            <p:ph type="ftr" sz="quarter" idx="11"/>
+          </p:nvPr>
+        </p:nvSpPr>
+        <p:spPr/>
+        <p:txBody>
+          <a:bodyPr/>
+          <a:lstStyle/>
+          <a:p>
+            <a:r>
+              <a:rPr lang="en-US" dirty="0"/>
+              <a:t>Learning React </a:t>
+            </a:r>
+            <a:r>
+              <a:rPr lang="en-US" dirty="0" err="1"/>
+              <a:t>Js</a:t>
+            </a:r>
+            <a:endParaRPr lang="en-US" dirty="0"/>
+          </a:p>
+        </p:txBody>
+      </p:sp>
+      <p:sp>
+        <p:nvSpPr>
+          <p:cNvPr id="5" name="Slide Number Placeholder 4"/>
+          <p:cNvSpPr>
+            <a:spLocks noGrp="1"/>
+          </p:cNvSpPr>
+          <p:nvPr>
+            <p:ph type="sldNum" sz="quarter" idx="12"/>
+          </p:nvPr>
+        </p:nvSpPr>
+        <p:spPr/>
+        <p:txBody>
+          <a:bodyPr/>
+          <a:lstStyle/>
+          <a:p>
+            <a:fld id="{B777A91B-BF1B-4ECE-B89B-72F2144CF226}" type="slidenum">
+              <a:rPr lang="en-US" smtClean="0"/>
+              <a:t>37</a:t>
+            </a:fld>
+            <a:endParaRPr lang="en-US"/>
+          </a:p>
+        </p:txBody>
+      </p:sp>
+      <p:pic>
+        <p:nvPicPr>
+          <p:cNvPr id="6" name="Picture 5"/>
+          <p:cNvPicPr>
+            <a:picLocks noChangeAspect="1"/>
+          </p:cNvPicPr>
+          <p:nvPr/>
+        </p:nvPicPr>
+        <p:blipFill>
+          <a:blip r:embed="rId2">
+            <a:extLst>
+              <a:ext uri="{28A0092B-C50C-407E-A947-70E740481C1C}">
+                <a14:useLocalDpi xmlns:a14="http://schemas.microsoft.com/office/drawing/2010/main" val="0"/>
+              </a:ext>
+            </a:extLst>
+          </a:blip>
+          <a:stretch>
+            <a:fillRect/>
+          </a:stretch>
+        </p:blipFill>
+        <p:spPr>
+          <a:xfrm>
+            <a:off x="157162" y="84137"/>
+            <a:ext cx="1362075" cy="561975"/>
+          </a:xfrm>
+          <a:prstGeom prst="rect">
+            <a:avLst/>
+          </a:prstGeom>
+        </p:spPr>
+      </p:pic>
+      <p:pic>
+        <p:nvPicPr>
+          <p:cNvPr id="9" name="Picture 8"/>
+          <p:cNvPicPr>
+            <a:picLocks noChangeAspect="1"/>
+          </p:cNvPicPr>
+          <p:nvPr/>
+        </p:nvPicPr>
+        <p:blipFill>
+          <a:blip r:embed="rId3"/>
+          <a:stretch>
+            <a:fillRect/>
+          </a:stretch>
+        </p:blipFill>
+        <p:spPr>
+          <a:xfrm>
+            <a:off x="489016" y="1366653"/>
+            <a:ext cx="6362667" cy="4105678"/>
+          </a:xfrm>
+          <a:prstGeom prst="rect">
+            <a:avLst/>
+          </a:prstGeom>
+        </p:spPr>
+      </p:pic>
+      <p:pic>
+        <p:nvPicPr>
+          <p:cNvPr id="10" name="Picture 9"/>
+          <p:cNvPicPr>
+            <a:picLocks noChangeAspect="1"/>
+          </p:cNvPicPr>
+          <p:nvPr/>
+        </p:nvPicPr>
+        <p:blipFill>
+          <a:blip r:embed="rId4"/>
+          <a:stretch>
+            <a:fillRect/>
+          </a:stretch>
+        </p:blipFill>
+        <p:spPr>
+          <a:xfrm>
+            <a:off x="3836866" y="5019374"/>
+            <a:ext cx="8088303" cy="1173498"/>
+          </a:xfrm>
+          <a:prstGeom prst="rect">
+            <a:avLst/>
+          </a:prstGeom>
+        </p:spPr>
+      </p:pic>
+    </p:spTree>
+    <p:extLst>
+      <p:ext uri="{BB962C8B-B14F-4D97-AF65-F5344CB8AC3E}">
+        <p14:creationId xmlns:p14="http://schemas.microsoft.com/office/powerpoint/2010/main" val="29116599"/>
+      </p:ext>
+    </p:extLst>
+  </p:cSld>
+  <p:clrMapOvr>
+    <a:masterClrMapping/>
+  </p:clrMapOvr>
+  <p:timing>
+    <p:tnLst>
+      <p:par>
+        <p:cTn id="1" dur="indefinite" restart="never" nodeType="tmRoot">
+          <p:childTnLst>
+            <p:seq concurrent="1" nextAc="seek">
+              <p:cTn id="2" dur="indefinite" nodeType="mainSeq">
+                <p:childTnLst>
+                  <p:par>
+                    <p:cTn id="3" fill="hold">
+                      <p:stCondLst>
+                        <p:cond delay="indefinite"/>
+                      </p:stCondLst>
+                      <p:childTnLst>
+                        <p:par>
+                          <p:cTn id="4" fill="hold">
+                            <p:stCondLst>
+                              <p:cond delay="0"/>
+                            </p:stCondLst>
+                            <p:childTnLst>
+                              <p:par>
+                                <p:cTn id="5" presetID="1" presetClass="entr" presetSubtype="0" fill="hold" nodeType="clickEffect">
+                                  <p:stCondLst>
+                                    <p:cond delay="0"/>
+                                  </p:stCondLst>
+                                  <p:childTnLst>
+                                    <p:set>
+                                      <p:cBhvr>
+                                        <p:cTn id="6" dur="1" fill="hold">
+                                          <p:stCondLst>
+                                            <p:cond delay="0"/>
+                                          </p:stCondLst>
+                                        </p:cTn>
+                                        <p:tgtEl>
+                                          <p:spTgt spid="10"/>
+                                        </p:tgtEl>
+                                        <p:attrNameLst>
+                                          <p:attrName>style.visibility</p:attrName>
+                                        </p:attrNameLst>
+                                      </p:cBhvr>
+                                      <p:to>
+                                        <p:strVal val="visible"/>
+                                      </p:to>
+                                    </p:set>
+                                  </p:childTnLst>
+                                </p:cTn>
+                              </p:par>
+                            </p:childTnLst>
+                          </p:cTn>
+                        </p:par>
+                      </p:childTnLst>
+                    </p:cTn>
+                  </p:par>
+                </p:childTnLst>
+              </p:cTn>
+              <p:prevCondLst>
+                <p:cond evt="onPrev" delay="0">
+                  <p:tgtEl>
+                    <p:sldTgt/>
+                  </p:tgtEl>
+                </p:cond>
+              </p:prevCondLst>
+              <p:nextCondLst>
+                <p:cond evt="onNext" delay="0">
+                  <p:tgtEl>
+                    <p:sldTgt/>
+                  </p:tgtEl>
+                </p:cond>
+              </p:nextCondLst>
+            </p:seq>
+          </p:childTnLst>
+        </p:cTn>
+      </p:par>
+    </p:tnLst>
+  </p:timing>
+</p:sld>
+</file>
+
+<file path=ppt/slides/slide38.xml><?xml version="1.0" encoding="utf-8"?>
+<p:sld xmlns:a="http://schemas.openxmlformats.org/drawingml/2006/main" xmlns:r="http://schemas.openxmlformats.org/officeDocument/2006/relationships" xmlns:p="http://schemas.openxmlformats.org/presentationml/2006/main">
+  <p:cSld>
+    <p:spTree>
+      <p:nvGrpSpPr>
+        <p:cNvPr id="1" name=""/>
+        <p:cNvGrpSpPr/>
+        <p:nvPr/>
+      </p:nvGrpSpPr>
+      <p:grpSpPr>
+        <a:xfrm>
+          <a:off x="0" y="0"/>
+          <a:ext cx="0" cy="0"/>
+          <a:chOff x="0" y="0"/>
+          <a:chExt cx="0" cy="0"/>
+        </a:xfrm>
+      </p:grpSpPr>
+      <p:sp>
+        <p:nvSpPr>
           <p:cNvPr id="4" name="Footer Placeholder 3"/>
           <p:cNvSpPr>
             <a:spLocks noGrp="1"/>
@@ -25677,7 +26017,7 @@
           <a:p>
             <a:fld id="{B777A91B-BF1B-4ECE-B89B-72F2144CF226}" type="slidenum">
               <a:rPr lang="en-US" smtClean="0"/>
-              <a:t>37</a:t>
+              <a:t>38</a:t>
             </a:fld>
             <a:endParaRPr lang="en-US"/>
           </a:p>
@@ -25847,7 +26187,7 @@
 </p:sld>
 </file>
 
-<file path=ppt/slides/slide38.xml><?xml version="1.0" encoding="utf-8"?>
+<file path=ppt/slides/slide39.xml><?xml version="1.0" encoding="utf-8"?>
 <p:sld xmlns:a="http://schemas.openxmlformats.org/drawingml/2006/main" xmlns:r="http://schemas.openxmlformats.org/officeDocument/2006/relationships" xmlns:p="http://schemas.openxmlformats.org/presentationml/2006/main">
   <p:cSld>
     <p:spTree>
@@ -25964,7 +26304,7 @@
           <a:p>
             <a:fld id="{B777A91B-BF1B-4ECE-B89B-72F2144CF226}" type="slidenum">
               <a:rPr lang="en-US" smtClean="0"/>
-              <a:t>38</a:t>
+              <a:t>39</a:t>
             </a:fld>
             <a:endParaRPr lang="en-US"/>
           </a:p>
@@ -26050,7 +26390,199 @@
 </p:sld>
 </file>
 
-<file path=ppt/slides/slide39.xml><?xml version="1.0" encoding="utf-8"?>
+<file path=ppt/slides/slide4.xml><?xml version="1.0" encoding="utf-8"?>
+<p:sld xmlns:a="http://schemas.openxmlformats.org/drawingml/2006/main" xmlns:r="http://schemas.openxmlformats.org/officeDocument/2006/relationships" xmlns:p="http://schemas.openxmlformats.org/presentationml/2006/main">
+  <p:cSld>
+    <p:spTree>
+      <p:nvGrpSpPr>
+        <p:cNvPr id="1" name=""/>
+        <p:cNvGrpSpPr/>
+        <p:nvPr/>
+      </p:nvGrpSpPr>
+      <p:grpSpPr>
+        <a:xfrm>
+          <a:off x="0" y="0"/>
+          <a:ext cx="0" cy="0"/>
+          <a:chOff x="0" y="0"/>
+          <a:chExt cx="0" cy="0"/>
+        </a:xfrm>
+      </p:grpSpPr>
+      <p:sp>
+        <p:nvSpPr>
+          <p:cNvPr id="2" name="Title 1"/>
+          <p:cNvSpPr>
+            <a:spLocks noGrp="1"/>
+          </p:cNvSpPr>
+          <p:nvPr>
+            <p:ph type="title"/>
+          </p:nvPr>
+        </p:nvSpPr>
+        <p:spPr/>
+        <p:txBody>
+          <a:bodyPr/>
+          <a:lstStyle/>
+          <a:p>
+            <a:r>
+              <a:rPr lang="en-US" dirty="0" smtClean="0"/>
+              <a:t>Problem with Two-way binding</a:t>
+            </a:r>
+            <a:endParaRPr lang="en-US" dirty="0"/>
+          </a:p>
+        </p:txBody>
+      </p:sp>
+      <p:sp>
+        <p:nvSpPr>
+          <p:cNvPr id="5" name="TextBox 4"/>
+          <p:cNvSpPr txBox="1"/>
+          <p:nvPr/>
+        </p:nvSpPr>
+        <p:spPr>
+          <a:xfrm>
+            <a:off x="1828800" y="4168588"/>
+            <a:ext cx="184731" cy="369332"/>
+          </a:xfrm>
+          <a:prstGeom prst="rect">
+            <a:avLst/>
+          </a:prstGeom>
+          <a:noFill/>
+        </p:spPr>
+        <p:txBody>
+          <a:bodyPr wrap="none" rtlCol="0">
+            <a:spAutoFit/>
+          </a:bodyPr>
+          <a:lstStyle/>
+          <a:p>
+            <a:endParaRPr lang="en-US" dirty="0"/>
+          </a:p>
+        </p:txBody>
+      </p:sp>
+      <p:pic>
+        <p:nvPicPr>
+          <p:cNvPr id="6" name="Picture 5"/>
+          <p:cNvPicPr>
+            <a:picLocks noChangeAspect="1"/>
+          </p:cNvPicPr>
+          <p:nvPr/>
+        </p:nvPicPr>
+        <p:blipFill>
+          <a:blip r:embed="rId3">
+            <a:extLst>
+              <a:ext uri="{28A0092B-C50C-407E-A947-70E740481C1C}">
+                <a14:useLocalDpi xmlns:a14="http://schemas.microsoft.com/office/drawing/2010/main" val="0"/>
+              </a:ext>
+            </a:extLst>
+          </a:blip>
+          <a:stretch>
+            <a:fillRect/>
+          </a:stretch>
+        </p:blipFill>
+        <p:spPr>
+          <a:xfrm>
+            <a:off x="1519237" y="1870075"/>
+            <a:ext cx="8262633" cy="4306888"/>
+          </a:xfrm>
+          <a:prstGeom prst="rect">
+            <a:avLst/>
+          </a:prstGeom>
+        </p:spPr>
+      </p:pic>
+      <p:sp>
+        <p:nvSpPr>
+          <p:cNvPr id="7" name="Slide Number Placeholder 6"/>
+          <p:cNvSpPr>
+            <a:spLocks noGrp="1"/>
+          </p:cNvSpPr>
+          <p:nvPr>
+            <p:ph type="sldNum" sz="quarter" idx="12"/>
+          </p:nvPr>
+        </p:nvSpPr>
+        <p:spPr/>
+        <p:txBody>
+          <a:bodyPr/>
+          <a:lstStyle/>
+          <a:p>
+            <a:fld id="{B777A91B-BF1B-4ECE-B89B-72F2144CF226}" type="slidenum">
+              <a:rPr lang="en-US" smtClean="0"/>
+              <a:t>4</a:t>
+            </a:fld>
+            <a:endParaRPr lang="en-US"/>
+          </a:p>
+        </p:txBody>
+      </p:sp>
+      <p:pic>
+        <p:nvPicPr>
+          <p:cNvPr id="8" name="Picture 7"/>
+          <p:cNvPicPr>
+            <a:picLocks noChangeAspect="1"/>
+          </p:cNvPicPr>
+          <p:nvPr/>
+        </p:nvPicPr>
+        <p:blipFill>
+          <a:blip r:embed="rId4">
+            <a:extLst>
+              <a:ext uri="{28A0092B-C50C-407E-A947-70E740481C1C}">
+                <a14:useLocalDpi xmlns:a14="http://schemas.microsoft.com/office/drawing/2010/main" val="0"/>
+              </a:ext>
+            </a:extLst>
+          </a:blip>
+          <a:stretch>
+            <a:fillRect/>
+          </a:stretch>
+        </p:blipFill>
+        <p:spPr>
+          <a:xfrm>
+            <a:off x="157162" y="84137"/>
+            <a:ext cx="1362075" cy="561975"/>
+          </a:xfrm>
+          <a:prstGeom prst="rect">
+            <a:avLst/>
+          </a:prstGeom>
+        </p:spPr>
+      </p:pic>
+      <p:sp>
+        <p:nvSpPr>
+          <p:cNvPr id="9" name="Footer Placeholder 8"/>
+          <p:cNvSpPr>
+            <a:spLocks noGrp="1"/>
+          </p:cNvSpPr>
+          <p:nvPr>
+            <p:ph type="ftr" sz="quarter" idx="11"/>
+          </p:nvPr>
+        </p:nvSpPr>
+        <p:spPr/>
+        <p:txBody>
+          <a:bodyPr/>
+          <a:lstStyle/>
+          <a:p>
+            <a:r>
+              <a:rPr lang="en-US" dirty="0" smtClean="0"/>
+              <a:t>Understanding Flux</a:t>
+            </a:r>
+            <a:endParaRPr lang="en-US" dirty="0"/>
+          </a:p>
+        </p:txBody>
+      </p:sp>
+    </p:spTree>
+    <p:extLst>
+      <p:ext uri="{BB962C8B-B14F-4D97-AF65-F5344CB8AC3E}">
+        <p14:creationId xmlns:p14="http://schemas.microsoft.com/office/powerpoint/2010/main" val="2718338151"/>
+      </p:ext>
+    </p:extLst>
+  </p:cSld>
+  <p:clrMapOvr>
+    <a:masterClrMapping/>
+  </p:clrMapOvr>
+  <p:timing>
+    <p:tnLst>
+      <p:par>
+        <p:cTn id="1" dur="indefinite" restart="never" nodeType="tmRoot"/>
+      </p:par>
+    </p:tnLst>
+  </p:timing>
+</p:sld>
+</file>
+
+<file path=ppt/slides/slide40.xml><?xml version="1.0" encoding="utf-8"?>
 <p:sld xmlns:a="http://schemas.openxmlformats.org/drawingml/2006/main" xmlns:r="http://schemas.openxmlformats.org/officeDocument/2006/relationships" xmlns:p="http://schemas.openxmlformats.org/presentationml/2006/main">
   <p:cSld>
     <p:spTree>
@@ -26136,7 +26668,7 @@
           <a:p>
             <a:fld id="{B777A91B-BF1B-4ECE-B89B-72F2144CF226}" type="slidenum">
               <a:rPr lang="en-US" smtClean="0"/>
-              <a:t>39</a:t>
+              <a:t>40</a:t>
             </a:fld>
             <a:endParaRPr lang="en-US"/>
           </a:p>
@@ -26242,198 +26774,6 @@
     <p:extLst>
       <p:ext uri="{BB962C8B-B14F-4D97-AF65-F5344CB8AC3E}">
         <p14:creationId xmlns:p14="http://schemas.microsoft.com/office/powerpoint/2010/main" val="2585180686"/>
-      </p:ext>
-    </p:extLst>
-  </p:cSld>
-  <p:clrMapOvr>
-    <a:masterClrMapping/>
-  </p:clrMapOvr>
-  <p:timing>
-    <p:tnLst>
-      <p:par>
-        <p:cTn id="1" dur="indefinite" restart="never" nodeType="tmRoot"/>
-      </p:par>
-    </p:tnLst>
-  </p:timing>
-</p:sld>
-</file>
-
-<file path=ppt/slides/slide4.xml><?xml version="1.0" encoding="utf-8"?>
-<p:sld xmlns:a="http://schemas.openxmlformats.org/drawingml/2006/main" xmlns:r="http://schemas.openxmlformats.org/officeDocument/2006/relationships" xmlns:p="http://schemas.openxmlformats.org/presentationml/2006/main">
-  <p:cSld>
-    <p:spTree>
-      <p:nvGrpSpPr>
-        <p:cNvPr id="1" name=""/>
-        <p:cNvGrpSpPr/>
-        <p:nvPr/>
-      </p:nvGrpSpPr>
-      <p:grpSpPr>
-        <a:xfrm>
-          <a:off x="0" y="0"/>
-          <a:ext cx="0" cy="0"/>
-          <a:chOff x="0" y="0"/>
-          <a:chExt cx="0" cy="0"/>
-        </a:xfrm>
-      </p:grpSpPr>
-      <p:sp>
-        <p:nvSpPr>
-          <p:cNvPr id="2" name="Title 1"/>
-          <p:cNvSpPr>
-            <a:spLocks noGrp="1"/>
-          </p:cNvSpPr>
-          <p:nvPr>
-            <p:ph type="title"/>
-          </p:nvPr>
-        </p:nvSpPr>
-        <p:spPr/>
-        <p:txBody>
-          <a:bodyPr/>
-          <a:lstStyle/>
-          <a:p>
-            <a:r>
-              <a:rPr lang="en-US" dirty="0" smtClean="0"/>
-              <a:t>Problem with Two-way binding</a:t>
-            </a:r>
-            <a:endParaRPr lang="en-US" dirty="0"/>
-          </a:p>
-        </p:txBody>
-      </p:sp>
-      <p:sp>
-        <p:nvSpPr>
-          <p:cNvPr id="5" name="TextBox 4"/>
-          <p:cNvSpPr txBox="1"/>
-          <p:nvPr/>
-        </p:nvSpPr>
-        <p:spPr>
-          <a:xfrm>
-            <a:off x="1828800" y="4168588"/>
-            <a:ext cx="184731" cy="369332"/>
-          </a:xfrm>
-          <a:prstGeom prst="rect">
-            <a:avLst/>
-          </a:prstGeom>
-          <a:noFill/>
-        </p:spPr>
-        <p:txBody>
-          <a:bodyPr wrap="none" rtlCol="0">
-            <a:spAutoFit/>
-          </a:bodyPr>
-          <a:lstStyle/>
-          <a:p>
-            <a:endParaRPr lang="en-US" dirty="0"/>
-          </a:p>
-        </p:txBody>
-      </p:sp>
-      <p:pic>
-        <p:nvPicPr>
-          <p:cNvPr id="6" name="Picture 5"/>
-          <p:cNvPicPr>
-            <a:picLocks noChangeAspect="1"/>
-          </p:cNvPicPr>
-          <p:nvPr/>
-        </p:nvPicPr>
-        <p:blipFill>
-          <a:blip r:embed="rId3">
-            <a:extLst>
-              <a:ext uri="{28A0092B-C50C-407E-A947-70E740481C1C}">
-                <a14:useLocalDpi xmlns:a14="http://schemas.microsoft.com/office/drawing/2010/main" val="0"/>
-              </a:ext>
-            </a:extLst>
-          </a:blip>
-          <a:stretch>
-            <a:fillRect/>
-          </a:stretch>
-        </p:blipFill>
-        <p:spPr>
-          <a:xfrm>
-            <a:off x="1519237" y="1870075"/>
-            <a:ext cx="8262633" cy="4306888"/>
-          </a:xfrm>
-          <a:prstGeom prst="rect">
-            <a:avLst/>
-          </a:prstGeom>
-        </p:spPr>
-      </p:pic>
-      <p:sp>
-        <p:nvSpPr>
-          <p:cNvPr id="7" name="Slide Number Placeholder 6"/>
-          <p:cNvSpPr>
-            <a:spLocks noGrp="1"/>
-          </p:cNvSpPr>
-          <p:nvPr>
-            <p:ph type="sldNum" sz="quarter" idx="12"/>
-          </p:nvPr>
-        </p:nvSpPr>
-        <p:spPr/>
-        <p:txBody>
-          <a:bodyPr/>
-          <a:lstStyle/>
-          <a:p>
-            <a:fld id="{B777A91B-BF1B-4ECE-B89B-72F2144CF226}" type="slidenum">
-              <a:rPr lang="en-US" smtClean="0"/>
-              <a:t>4</a:t>
-            </a:fld>
-            <a:endParaRPr lang="en-US"/>
-          </a:p>
-        </p:txBody>
-      </p:sp>
-      <p:pic>
-        <p:nvPicPr>
-          <p:cNvPr id="8" name="Picture 7"/>
-          <p:cNvPicPr>
-            <a:picLocks noChangeAspect="1"/>
-          </p:cNvPicPr>
-          <p:nvPr/>
-        </p:nvPicPr>
-        <p:blipFill>
-          <a:blip r:embed="rId4">
-            <a:extLst>
-              <a:ext uri="{28A0092B-C50C-407E-A947-70E740481C1C}">
-                <a14:useLocalDpi xmlns:a14="http://schemas.microsoft.com/office/drawing/2010/main" val="0"/>
-              </a:ext>
-            </a:extLst>
-          </a:blip>
-          <a:stretch>
-            <a:fillRect/>
-          </a:stretch>
-        </p:blipFill>
-        <p:spPr>
-          <a:xfrm>
-            <a:off x="157162" y="84137"/>
-            <a:ext cx="1362075" cy="561975"/>
-          </a:xfrm>
-          <a:prstGeom prst="rect">
-            <a:avLst/>
-          </a:prstGeom>
-        </p:spPr>
-      </p:pic>
-      <p:sp>
-        <p:nvSpPr>
-          <p:cNvPr id="9" name="Footer Placeholder 8"/>
-          <p:cNvSpPr>
-            <a:spLocks noGrp="1"/>
-          </p:cNvSpPr>
-          <p:nvPr>
-            <p:ph type="ftr" sz="quarter" idx="11"/>
-          </p:nvPr>
-        </p:nvSpPr>
-        <p:spPr/>
-        <p:txBody>
-          <a:bodyPr/>
-          <a:lstStyle/>
-          <a:p>
-            <a:r>
-              <a:rPr lang="en-US" dirty="0" smtClean="0"/>
-              <a:t>Understanding Flux</a:t>
-            </a:r>
-            <a:endParaRPr lang="en-US" dirty="0"/>
-          </a:p>
-        </p:txBody>
-      </p:sp>
-    </p:spTree>
-    <p:extLst>
-      <p:ext uri="{BB962C8B-B14F-4D97-AF65-F5344CB8AC3E}">
-        <p14:creationId xmlns:p14="http://schemas.microsoft.com/office/powerpoint/2010/main" val="2718338151"/>
       </p:ext>
     </p:extLst>
   </p:cSld>
@@ -27345,15 +27685,7 @@
           <a:p>
             <a:r>
               <a:rPr lang="en-US" dirty="0" smtClean="0"/>
-              <a:t>No (we wil</a:t>
-            </a:r>
-            <a:r>
-              <a:rPr lang="en-US" dirty="0" smtClean="0"/>
-              <a:t>l use jest</a:t>
-            </a:r>
-            <a:r>
-              <a:rPr lang="en-US" dirty="0" smtClean="0"/>
-              <a:t>)</a:t>
+              <a:t>No (we will use jest)</a:t>
             </a:r>
           </a:p>
           <a:p>
@@ -27365,11 +27697,7 @@
           <a:p>
             <a:r>
               <a:rPr lang="en-US" dirty="0" smtClean="0"/>
-              <a:t>Yes</a:t>
-            </a:r>
-            <a:r>
-              <a:rPr lang="en-US" dirty="0" smtClean="0"/>
-              <a:t>		</a:t>
+              <a:t>Yes		</a:t>
             </a:r>
             <a:endParaRPr lang="en-US" dirty="0"/>
           </a:p>
@@ -27675,11 +28003,7 @@
           <a:p>
             <a:r>
               <a:rPr lang="en-US" dirty="0" smtClean="0"/>
-              <a:t>Flexible Directory Structure</a:t>
-            </a:r>
-            <a:r>
-              <a:rPr lang="en-US" dirty="0" smtClean="0"/>
-              <a:t>			</a:t>
+              <a:t>Flexible Directory Structure			</a:t>
             </a:r>
             <a:endParaRPr lang="en-US" dirty="0"/>
           </a:p>

</xml_diff>

<commit_message>
updated screenshot of test
Signed-off-by: tahir-masood1 <onlytahir@hotmail.com>
</commit_message>
<xml_diff>
--- a/React.pptx
+++ b/React.pptx
@@ -24570,25 +24570,6 @@
       </p:grpSpPr>
       <p:sp>
         <p:nvSpPr>
-          <p:cNvPr id="2" name="Title 1"/>
-          <p:cNvSpPr>
-            <a:spLocks noGrp="1"/>
-          </p:cNvSpPr>
-          <p:nvPr>
-            <p:ph type="title"/>
-          </p:nvPr>
-        </p:nvSpPr>
-        <p:spPr/>
-        <p:txBody>
-          <a:bodyPr/>
-          <a:lstStyle/>
-          <a:p>
-            <a:endParaRPr lang="en-US" dirty="0"/>
-          </a:p>
-        </p:txBody>
-      </p:sp>
-      <p:sp>
-        <p:nvSpPr>
           <p:cNvPr id="4" name="Footer Placeholder 3"/>
           <p:cNvSpPr>
             <a:spLocks noGrp="1"/>
@@ -26676,9 +26657,37 @@
           </a:p>
         </p:txBody>
       </p:sp>
+      <p:sp>
+        <p:nvSpPr>
+          <p:cNvPr id="9" name="Title 1"/>
+          <p:cNvSpPr>
+            <a:spLocks noGrp="1"/>
+          </p:cNvSpPr>
+          <p:nvPr>
+            <p:ph type="title"/>
+          </p:nvPr>
+        </p:nvSpPr>
+        <p:spPr>
+          <a:xfrm>
+            <a:off x="431040" y="129146"/>
+            <a:ext cx="10515600" cy="1325563"/>
+          </a:xfrm>
+        </p:spPr>
+        <p:txBody>
+          <a:bodyPr/>
+          <a:lstStyle/>
+          <a:p>
+            <a:r>
+              <a:rPr lang="en-US" dirty="0" smtClean="0"/>
+              <a:t>Test And Result</a:t>
+            </a:r>
+            <a:endParaRPr lang="en-US" dirty="0"/>
+          </a:p>
+        </p:txBody>
+      </p:sp>
       <p:pic>
         <p:nvPicPr>
-          <p:cNvPr id="7" name="Picture 6"/>
+          <p:cNvPr id="2" name="Picture 1"/>
           <p:cNvPicPr>
             <a:picLocks noChangeAspect="1"/>
           </p:cNvPicPr>
@@ -26692,45 +26701,17 @@
         </p:blipFill>
         <p:spPr>
           <a:xfrm>
-            <a:off x="431040" y="1599909"/>
-            <a:ext cx="6648450" cy="4611240"/>
+            <a:off x="96592" y="1005168"/>
+            <a:ext cx="6459483" cy="5635853"/>
           </a:xfrm>
           <a:prstGeom prst="rect">
             <a:avLst/>
           </a:prstGeom>
         </p:spPr>
       </p:pic>
-      <p:sp>
-        <p:nvSpPr>
-          <p:cNvPr id="9" name="Title 1"/>
-          <p:cNvSpPr>
-            <a:spLocks noGrp="1"/>
-          </p:cNvSpPr>
-          <p:nvPr>
-            <p:ph type="title"/>
-          </p:nvPr>
-        </p:nvSpPr>
-        <p:spPr>
-          <a:xfrm>
-            <a:off x="431040" y="129146"/>
-            <a:ext cx="10515600" cy="1325563"/>
-          </a:xfrm>
-        </p:spPr>
-        <p:txBody>
-          <a:bodyPr/>
-          <a:lstStyle/>
-          <a:p>
-            <a:r>
-              <a:rPr lang="en-US" dirty="0" smtClean="0"/>
-              <a:t>Test And Result</a:t>
-            </a:r>
-            <a:endParaRPr lang="en-US" dirty="0"/>
-          </a:p>
-        </p:txBody>
-      </p:sp>
       <p:pic>
         <p:nvPicPr>
-          <p:cNvPr id="10" name="Picture 9"/>
+          <p:cNvPr id="3" name="Picture 2"/>
           <p:cNvPicPr>
             <a:picLocks noChangeAspect="1"/>
           </p:cNvPicPr>
@@ -26744,8 +26725,8 @@
         </p:blipFill>
         <p:spPr>
           <a:xfrm>
-            <a:off x="7202242" y="2326648"/>
-            <a:ext cx="4848090" cy="1781712"/>
+            <a:off x="6700467" y="2500097"/>
+            <a:ext cx="5307503" cy="1726846"/>
           </a:xfrm>
           <a:prstGeom prst="rect">
             <a:avLst/>
@@ -26796,7 +26777,7 @@
                                           </p:stCondLst>
                                         </p:cTn>
                                         <p:tgtEl>
-                                          <p:spTgt spid="10"/>
+                                          <p:spTgt spid="3"/>
                                         </p:tgtEl>
                                         <p:attrNameLst>
                                           <p:attrName>style.visibility</p:attrName>
@@ -27292,7 +27273,9 @@
           </a:xfrm>
         </p:spPr>
         <p:txBody>
-          <a:bodyPr/>
+          <a:bodyPr>
+            <a:normAutofit/>
+          </a:bodyPr>
           <a:lstStyle/>
           <a:p>
             <a:r>
@@ -27377,7 +27360,7 @@
               <a:rPr lang="en-US" dirty="0" smtClean="0">
                 <a:hlinkClick r:id="rId7"/>
               </a:rPr>
-              <a:t>github.com/rackt/react-router</a:t>
+              <a:t>facebook.github.io/react/blog/2014/09/24/testing-flux-applications.html</a:t>
             </a:r>
             <a:endParaRPr lang="en-US" dirty="0" smtClean="0"/>
           </a:p>
@@ -27386,17 +27369,38 @@
               <a:rPr lang="en-US" dirty="0" smtClean="0">
                 <a:hlinkClick r:id="rId8"/>
               </a:rPr>
-              <a:t>http</a:t>
+              <a:t>https</a:t>
             </a:r>
             <a:r>
               <a:rPr lang="en-US" dirty="0">
                 <a:hlinkClick r:id="rId8"/>
               </a:rPr>
-              <a:t>://es6-features.org/#</a:t>
+              <a:t>://</a:t>
             </a:r>
             <a:r>
               <a:rPr lang="en-US" dirty="0" smtClean="0">
                 <a:hlinkClick r:id="rId8"/>
+              </a:rPr>
+              <a:t>github.com/rackt/react-router</a:t>
+            </a:r>
+            <a:endParaRPr lang="en-US" dirty="0" smtClean="0"/>
+          </a:p>
+          <a:p>
+            <a:r>
+              <a:rPr lang="en-US" dirty="0" smtClean="0">
+                <a:hlinkClick r:id="rId9"/>
+              </a:rPr>
+              <a:t>http</a:t>
+            </a:r>
+            <a:r>
+              <a:rPr lang="en-US" dirty="0">
+                <a:hlinkClick r:id="rId9"/>
+              </a:rPr>
+              <a:t>://es6-features.org/#</a:t>
+            </a:r>
+            <a:r>
+              <a:rPr lang="en-US" dirty="0" smtClean="0">
+                <a:hlinkClick r:id="rId9"/>
               </a:rPr>
               <a:t>Constants</a:t>
             </a:r>
@@ -27478,7 +27482,7 @@
           <p:nvPr/>
         </p:nvPicPr>
         <p:blipFill>
-          <a:blip r:embed="rId9">
+          <a:blip r:embed="rId10">
             <a:extLst>
               <a:ext uri="{28A0092B-C50C-407E-A947-70E740481C1C}">
                 <a14:useLocalDpi xmlns:a14="http://schemas.microsoft.com/office/drawing/2010/main" val="0"/>

</xml_diff>

<commit_message>
updated Signed-off-by: tahir-masood1 <onlytahir@hotmail.com>
</commit_message>
<xml_diff>
--- a/React.pptx
+++ b/React.pptx
@@ -297,7 +297,7 @@
           <a:p>
             <a:fld id="{0CFB67D1-B930-45EB-8ABD-6B5C9D4B80D1}" type="datetimeFigureOut">
               <a:rPr lang="en-US" smtClean="0"/>
-              <a:t>12/31/2015</a:t>
+              <a:t>1/1/2016</a:t>
             </a:fld>
             <a:endParaRPr lang="en-US"/>
           </a:p>
@@ -467,7 +467,7 @@
           <a:p>
             <a:fld id="{ED1B4B99-2273-4D0F-B50E-7680EF1753AD}" type="datetimeFigureOut">
               <a:rPr lang="en-US" smtClean="0"/>
-              <a:t>12/31/2015</a:t>
+              <a:t>1/1/2016</a:t>
             </a:fld>
             <a:endParaRPr lang="en-US"/>
           </a:p>
@@ -1316,18 +1316,41 @@
           <a:bodyPr/>
           <a:lstStyle/>
           <a:p>
-            <a:endParaRPr lang="en-US" dirty="0"/>
-          </a:p>
-        </p:txBody>
-      </p:sp>
-      <p:sp>
-        <p:nvSpPr>
-          <p:cNvPr id="4" name="Slide Number Placeholder 3"/>
-          <p:cNvSpPr>
-            <a:spLocks noGrp="1"/>
-          </p:cNvSpPr>
-          <p:nvPr>
-            <p:ph type="sldNum" sz="quarter" idx="10"/>
+            <a:endParaRPr lang="en-US"/>
+          </a:p>
+        </p:txBody>
+      </p:sp>
+      <p:sp>
+        <p:nvSpPr>
+          <p:cNvPr id="4" name="Header Placeholder 3"/>
+          <p:cNvSpPr>
+            <a:spLocks noGrp="1"/>
+          </p:cNvSpPr>
+          <p:nvPr>
+            <p:ph type="hdr" sz="quarter" idx="10"/>
+          </p:nvPr>
+        </p:nvSpPr>
+        <p:spPr/>
+        <p:txBody>
+          <a:bodyPr/>
+          <a:lstStyle/>
+          <a:p>
+            <a:r>
+              <a:rPr lang="en-US" smtClean="0"/>
+              <a:t>TEST</a:t>
+            </a:r>
+            <a:endParaRPr lang="en-US"/>
+          </a:p>
+        </p:txBody>
+      </p:sp>
+      <p:sp>
+        <p:nvSpPr>
+          <p:cNvPr id="5" name="Slide Number Placeholder 4"/>
+          <p:cNvSpPr>
+            <a:spLocks noGrp="1"/>
+          </p:cNvSpPr>
+          <p:nvPr>
+            <p:ph type="sldNum" sz="quarter" idx="11"/>
           </p:nvPr>
         </p:nvSpPr>
         <p:spPr/>
@@ -1337,31 +1360,8 @@
           <a:p>
             <a:fld id="{B1206FEA-4AFC-4465-8ABD-ECC3D411179B}" type="slidenum">
               <a:rPr lang="en-US" smtClean="0"/>
-              <a:t>23</a:t>
+              <a:t>22</a:t>
             </a:fld>
-            <a:endParaRPr lang="en-US"/>
-          </a:p>
-        </p:txBody>
-      </p:sp>
-      <p:sp>
-        <p:nvSpPr>
-          <p:cNvPr id="5" name="Header Placeholder 4"/>
-          <p:cNvSpPr>
-            <a:spLocks noGrp="1"/>
-          </p:cNvSpPr>
-          <p:nvPr>
-            <p:ph type="hdr" sz="quarter" idx="11"/>
-          </p:nvPr>
-        </p:nvSpPr>
-        <p:spPr/>
-        <p:txBody>
-          <a:bodyPr/>
-          <a:lstStyle/>
-          <a:p>
-            <a:r>
-              <a:rPr lang="en-US" smtClean="0"/>
-              <a:t>TEST</a:t>
-            </a:r>
             <a:endParaRPr lang="en-US"/>
           </a:p>
         </p:txBody>
@@ -1369,7 +1369,7 @@
     </p:spTree>
     <p:extLst>
       <p:ext uri="{BB962C8B-B14F-4D97-AF65-F5344CB8AC3E}">
-        <p14:creationId xmlns:p14="http://schemas.microsoft.com/office/powerpoint/2010/main" val="4238810153"/>
+        <p14:creationId xmlns:p14="http://schemas.microsoft.com/office/powerpoint/2010/main" val="679379910"/>
       </p:ext>
     </p:extLst>
   </p:cSld>
@@ -1423,35 +1423,41 @@
           <a:bodyPr/>
           <a:lstStyle/>
           <a:p>
-            <a:r>
-              <a:rPr lang="en-US" dirty="0" smtClean="0"/>
-              <a:t>We have learned the React rendering enough so far.</a:t>
-            </a:r>
-          </a:p>
-          <a:p>
-            <a:r>
-              <a:rPr lang="en-US" dirty="0" smtClean="0"/>
-              <a:t>Lets use a react view in our app to render the </a:t>
-            </a:r>
-            <a:r>
-              <a:rPr lang="en-US" dirty="0" err="1" smtClean="0"/>
-              <a:t>todos</a:t>
-            </a:r>
-            <a:endParaRPr lang="en-US" dirty="0" smtClean="0"/>
-          </a:p>
-          <a:p>
             <a:endParaRPr lang="en-US" dirty="0"/>
           </a:p>
         </p:txBody>
       </p:sp>
       <p:sp>
         <p:nvSpPr>
-          <p:cNvPr id="4" name="Header Placeholder 3"/>
-          <p:cNvSpPr>
-            <a:spLocks noGrp="1"/>
-          </p:cNvSpPr>
-          <p:nvPr>
-            <p:ph type="hdr" sz="quarter" idx="10"/>
+          <p:cNvPr id="4" name="Slide Number Placeholder 3"/>
+          <p:cNvSpPr>
+            <a:spLocks noGrp="1"/>
+          </p:cNvSpPr>
+          <p:nvPr>
+            <p:ph type="sldNum" sz="quarter" idx="10"/>
+          </p:nvPr>
+        </p:nvSpPr>
+        <p:spPr/>
+        <p:txBody>
+          <a:bodyPr/>
+          <a:lstStyle/>
+          <a:p>
+            <a:fld id="{B1206FEA-4AFC-4465-8ABD-ECC3D411179B}" type="slidenum">
+              <a:rPr lang="en-US" smtClean="0"/>
+              <a:t>23</a:t>
+            </a:fld>
+            <a:endParaRPr lang="en-US"/>
+          </a:p>
+        </p:txBody>
+      </p:sp>
+      <p:sp>
+        <p:nvSpPr>
+          <p:cNvPr id="5" name="Header Placeholder 4"/>
+          <p:cNvSpPr>
+            <a:spLocks noGrp="1"/>
+          </p:cNvSpPr>
+          <p:nvPr>
+            <p:ph type="hdr" sz="quarter" idx="11"/>
           </p:nvPr>
         </p:nvSpPr>
         <p:spPr/>
@@ -1463,29 +1469,6 @@
               <a:rPr lang="en-US" smtClean="0"/>
               <a:t>TEST</a:t>
             </a:r>
-            <a:endParaRPr lang="en-US"/>
-          </a:p>
-        </p:txBody>
-      </p:sp>
-      <p:sp>
-        <p:nvSpPr>
-          <p:cNvPr id="5" name="Slide Number Placeholder 4"/>
-          <p:cNvSpPr>
-            <a:spLocks noGrp="1"/>
-          </p:cNvSpPr>
-          <p:nvPr>
-            <p:ph type="sldNum" sz="quarter" idx="11"/>
-          </p:nvPr>
-        </p:nvSpPr>
-        <p:spPr/>
-        <p:txBody>
-          <a:bodyPr/>
-          <a:lstStyle/>
-          <a:p>
-            <a:fld id="{B1206FEA-4AFC-4465-8ABD-ECC3D411179B}" type="slidenum">
-              <a:rPr lang="en-US" smtClean="0"/>
-              <a:t>24</a:t>
-            </a:fld>
             <a:endParaRPr lang="en-US"/>
           </a:p>
         </p:txBody>
@@ -1493,7 +1476,7 @@
     </p:spTree>
     <p:extLst>
       <p:ext uri="{BB962C8B-B14F-4D97-AF65-F5344CB8AC3E}">
-        <p14:creationId xmlns:p14="http://schemas.microsoft.com/office/powerpoint/2010/main" val="3701715139"/>
+        <p14:creationId xmlns:p14="http://schemas.microsoft.com/office/powerpoint/2010/main" val="4238810153"/>
       </p:ext>
     </p:extLst>
   </p:cSld>
@@ -1547,58 +1530,23 @@
           <a:bodyPr/>
           <a:lstStyle/>
           <a:p>
+            <a:r>
+              <a:rPr lang="en-US" dirty="0" smtClean="0"/>
+              <a:t>We have learned the React rendering enough so far.</a:t>
+            </a:r>
+          </a:p>
+          <a:p>
+            <a:r>
+              <a:rPr lang="en-US" dirty="0" smtClean="0"/>
+              <a:t>Lets use a react view in our app to render the </a:t>
+            </a:r>
+            <a:r>
+              <a:rPr lang="en-US" dirty="0" err="1" smtClean="0"/>
+              <a:t>todos</a:t>
+            </a:r>
             <a:endParaRPr lang="en-US" dirty="0" smtClean="0"/>
           </a:p>
           <a:p>
-            <a:r>
-              <a:rPr lang="en-US" sz="1200" dirty="0" smtClean="0"/>
-              <a:t>We need to pass the alt store’s state data to the view.</a:t>
-            </a:r>
-          </a:p>
-          <a:p>
-            <a:endParaRPr lang="en-US" sz="1200" dirty="0" smtClean="0"/>
-          </a:p>
-          <a:p>
-            <a:r>
-              <a:rPr lang="en-US" sz="1200" dirty="0" smtClean="0"/>
-              <a:t>Alt provides a built-in components that binds an specific store to the specific view. This is known as Component Container</a:t>
-            </a:r>
-          </a:p>
-          <a:p>
-            <a:endParaRPr lang="en-US" dirty="0" smtClean="0"/>
-          </a:p>
-          <a:p>
-            <a:pPr marL="0" marR="0" indent="0" algn="l" defTabSz="914400" rtl="0" eaLnBrk="1" fontAlgn="auto" latinLnBrk="0" hangingPunct="1">
-              <a:lnSpc>
-                <a:spcPct val="100000"/>
-              </a:lnSpc>
-              <a:spcBef>
-                <a:spcPts val="0"/>
-              </a:spcBef>
-              <a:spcAft>
-                <a:spcPts val="0"/>
-              </a:spcAft>
-              <a:buClrTx/>
-              <a:buSzTx/>
-              <a:buFontTx/>
-              <a:buNone/>
-              <a:tabLst/>
-              <a:defRPr/>
-            </a:pPr>
-            <a:r>
-              <a:rPr lang="en-US" sz="1200" dirty="0" smtClean="0"/>
-              <a:t>This will actually pass the state data from the store to the view as a prop. Hence the Customer component can now access the state data from Customer Store </a:t>
-            </a:r>
-            <a:r>
-              <a:rPr lang="en-US" sz="1200" dirty="0" err="1" smtClean="0"/>
-              <a:t>i.e</a:t>
-            </a:r>
-            <a:r>
-              <a:rPr lang="en-US" sz="1200" dirty="0" smtClean="0"/>
-              <a:t> customers from its prop.</a:t>
-            </a:r>
-          </a:p>
-          <a:p>
             <a:endParaRPr lang="en-US" dirty="0"/>
           </a:p>
         </p:txBody>
@@ -1643,7 +1591,7 @@
           <a:p>
             <a:fld id="{B1206FEA-4AFC-4465-8ABD-ECC3D411179B}" type="slidenum">
               <a:rPr lang="en-US" smtClean="0"/>
-              <a:t>25</a:t>
+              <a:t>24</a:t>
             </a:fld>
             <a:endParaRPr lang="en-US"/>
           </a:p>
@@ -1652,7 +1600,7 @@
     </p:spTree>
     <p:extLst>
       <p:ext uri="{BB962C8B-B14F-4D97-AF65-F5344CB8AC3E}">
-        <p14:creationId xmlns:p14="http://schemas.microsoft.com/office/powerpoint/2010/main" val="2010599516"/>
+        <p14:creationId xmlns:p14="http://schemas.microsoft.com/office/powerpoint/2010/main" val="3701715139"/>
       </p:ext>
     </p:extLst>
   </p:cSld>
@@ -1706,6 +1654,27 @@
           <a:bodyPr/>
           <a:lstStyle/>
           <a:p>
+            <a:endParaRPr lang="en-US" dirty="0" smtClean="0"/>
+          </a:p>
+          <a:p>
+            <a:r>
+              <a:rPr lang="en-US" sz="1200" dirty="0" smtClean="0"/>
+              <a:t>We need to pass the alt store’s state data to the view.</a:t>
+            </a:r>
+          </a:p>
+          <a:p>
+            <a:endParaRPr lang="en-US" sz="1200" dirty="0" smtClean="0"/>
+          </a:p>
+          <a:p>
+            <a:r>
+              <a:rPr lang="en-US" sz="1200" dirty="0" smtClean="0"/>
+              <a:t>Alt provides a built-in components that binds an specific store to the specific view. This is known as Component Container</a:t>
+            </a:r>
+          </a:p>
+          <a:p>
+            <a:endParaRPr lang="en-US" dirty="0" smtClean="0"/>
+          </a:p>
+          <a:p>
             <a:pPr marL="0" marR="0" indent="0" algn="l" defTabSz="914400" rtl="0" eaLnBrk="1" fontAlgn="auto" latinLnBrk="0" hangingPunct="1">
               <a:lnSpc>
                 <a:spcPct val="100000"/>
@@ -1725,7 +1694,15 @@
             </a:pPr>
             <a:r>
               <a:rPr lang="en-US" sz="1200" dirty="0" smtClean="0"/>
-              <a:t>Use the following code in Todos.js of component directory</a:t>
+              <a:t>This will actually pass the state data from the store to the view as a prop. Hence the Customer component can now access the state data from Customer Store </a:t>
+            </a:r>
+            <a:r>
+              <a:rPr lang="en-US" sz="1200" dirty="0" err="1" smtClean="0"/>
+              <a:t>i.e</a:t>
+            </a:r>
+            <a:r>
+              <a:rPr lang="en-US" sz="1200" dirty="0" smtClean="0"/>
+              <a:t> customers from its prop.</a:t>
             </a:r>
           </a:p>
           <a:p>
@@ -1773,7 +1750,7 @@
           <a:p>
             <a:fld id="{B1206FEA-4AFC-4465-8ABD-ECC3D411179B}" type="slidenum">
               <a:rPr lang="en-US" smtClean="0"/>
-              <a:t>26</a:t>
+              <a:t>25</a:t>
             </a:fld>
             <a:endParaRPr lang="en-US"/>
           </a:p>
@@ -1782,7 +1759,7 @@
     </p:spTree>
     <p:extLst>
       <p:ext uri="{BB962C8B-B14F-4D97-AF65-F5344CB8AC3E}">
-        <p14:creationId xmlns:p14="http://schemas.microsoft.com/office/powerpoint/2010/main" val="1555669338"/>
+        <p14:creationId xmlns:p14="http://schemas.microsoft.com/office/powerpoint/2010/main" val="2010599516"/>
       </p:ext>
     </p:extLst>
   </p:cSld>
@@ -1903,7 +1880,7 @@
           <a:p>
             <a:fld id="{B1206FEA-4AFC-4465-8ABD-ECC3D411179B}" type="slidenum">
               <a:rPr lang="en-US" smtClean="0"/>
-              <a:t>27</a:t>
+              <a:t>26</a:t>
             </a:fld>
             <a:endParaRPr lang="en-US"/>
           </a:p>
@@ -1912,7 +1889,7 @@
     </p:spTree>
     <p:extLst>
       <p:ext uri="{BB962C8B-B14F-4D97-AF65-F5344CB8AC3E}">
-        <p14:creationId xmlns:p14="http://schemas.microsoft.com/office/powerpoint/2010/main" val="3944715601"/>
+        <p14:creationId xmlns:p14="http://schemas.microsoft.com/office/powerpoint/2010/main" val="1555669338"/>
       </p:ext>
     </p:extLst>
   </p:cSld>
@@ -1985,36 +1962,8 @@
             </a:pPr>
             <a:r>
               <a:rPr lang="en-US" sz="1200" dirty="0" smtClean="0"/>
-              <a:t>Use</a:t>
-            </a:r>
-            <a:r>
-              <a:rPr lang="en-US" sz="1200" baseline="0" dirty="0" smtClean="0"/>
-              <a:t> the code in index.html</a:t>
-            </a:r>
-          </a:p>
-          <a:p>
-            <a:pPr marL="0" marR="0" indent="0" algn="l" defTabSz="914400" rtl="0" eaLnBrk="1" fontAlgn="auto" latinLnBrk="0" hangingPunct="1">
-              <a:lnSpc>
-                <a:spcPct val="100000"/>
-              </a:lnSpc>
-              <a:spcBef>
-                <a:spcPts val="0"/>
-              </a:spcBef>
-              <a:spcAft>
-                <a:spcPts val="0"/>
-              </a:spcAft>
-              <a:buClrTx/>
-              <a:buSzTx/>
-              <a:buFontTx/>
-              <a:buNone/>
-              <a:tabLst/>
-              <a:defRPr/>
-            </a:pPr>
-            <a:r>
-              <a:rPr lang="en-US" sz="1200" baseline="0" dirty="0" smtClean="0"/>
-              <a:t>And in app.js</a:t>
-            </a:r>
-            <a:endParaRPr lang="en-US" sz="1200" dirty="0" smtClean="0"/>
+              <a:t>Use the following code in Todos.js of component directory</a:t>
+            </a:r>
           </a:p>
           <a:p>
             <a:endParaRPr lang="en-US" dirty="0"/>
@@ -2061,7 +2010,7 @@
           <a:p>
             <a:fld id="{B1206FEA-4AFC-4465-8ABD-ECC3D411179B}" type="slidenum">
               <a:rPr lang="en-US" smtClean="0"/>
-              <a:t>28</a:t>
+              <a:t>27</a:t>
             </a:fld>
             <a:endParaRPr lang="en-US"/>
           </a:p>
@@ -2070,7 +2019,7 @@
     </p:spTree>
     <p:extLst>
       <p:ext uri="{BB962C8B-B14F-4D97-AF65-F5344CB8AC3E}">
-        <p14:creationId xmlns:p14="http://schemas.microsoft.com/office/powerpoint/2010/main" val="2837921313"/>
+        <p14:creationId xmlns:p14="http://schemas.microsoft.com/office/powerpoint/2010/main" val="3944715601"/>
       </p:ext>
     </p:extLst>
   </p:cSld>
@@ -2124,54 +2073,55 @@
           <a:bodyPr/>
           <a:lstStyle/>
           <a:p>
-            <a:r>
-              <a:rPr lang="en-US" dirty="0" smtClean="0"/>
-              <a:t>So far we use just the </a:t>
-            </a:r>
-            <a:r>
-              <a:rPr lang="en-US" dirty="0" err="1" smtClean="0"/>
-              <a:t>jsx</a:t>
-            </a:r>
-            <a:r>
-              <a:rPr lang="en-US" dirty="0" smtClean="0"/>
-              <a:t> syntax in our component and also used the ES6 features in the stores.</a:t>
-            </a:r>
-          </a:p>
-          <a:p>
-            <a:r>
-              <a:rPr lang="en-US" dirty="0" smtClean="0"/>
-              <a:t>Browser don’t knows the </a:t>
-            </a:r>
-            <a:r>
-              <a:rPr lang="en-US" dirty="0" err="1" smtClean="0"/>
-              <a:t>jsx</a:t>
-            </a:r>
-            <a:r>
-              <a:rPr lang="en-US" dirty="0" smtClean="0"/>
-              <a:t> syntax in </a:t>
-            </a:r>
-            <a:r>
-              <a:rPr lang="en-US" dirty="0" err="1" smtClean="0"/>
-              <a:t>javascript</a:t>
-            </a:r>
-            <a:r>
-              <a:rPr lang="en-US" dirty="0" smtClean="0"/>
-              <a:t> so we need some transformer utility that transform this syntax to plain script for browser to digest.</a:t>
-            </a:r>
-          </a:p>
-          <a:p>
-            <a:r>
-              <a:rPr lang="en-US" dirty="0" smtClean="0"/>
-              <a:t>Babel.js done this job pretty well this can be use directly by linking its script file or using </a:t>
-            </a:r>
-            <a:r>
-              <a:rPr lang="en-US" dirty="0" err="1" smtClean="0"/>
-              <a:t>npm</a:t>
-            </a:r>
-            <a:r>
-              <a:rPr lang="en-US" dirty="0" smtClean="0"/>
-              <a:t>. </a:t>
-            </a:r>
+            <a:pPr marL="0" marR="0" indent="0" algn="l" defTabSz="914400" rtl="0" eaLnBrk="1" fontAlgn="auto" latinLnBrk="0" hangingPunct="1">
+              <a:lnSpc>
+                <a:spcPct val="100000"/>
+              </a:lnSpc>
+              <a:spcBef>
+                <a:spcPts val="0"/>
+              </a:spcBef>
+              <a:spcAft>
+                <a:spcPts val="0"/>
+              </a:spcAft>
+              <a:buClrTx/>
+              <a:buSzTx/>
+              <a:buFontTx/>
+              <a:buNone/>
+              <a:tabLst/>
+              <a:defRPr/>
+            </a:pPr>
+            <a:r>
+              <a:rPr lang="en-US" sz="1200" dirty="0" smtClean="0"/>
+              <a:t>Use</a:t>
+            </a:r>
+            <a:r>
+              <a:rPr lang="en-US" sz="1200" baseline="0" dirty="0" smtClean="0"/>
+              <a:t> the code in index.html</a:t>
+            </a:r>
+          </a:p>
+          <a:p>
+            <a:pPr marL="0" marR="0" indent="0" algn="l" defTabSz="914400" rtl="0" eaLnBrk="1" fontAlgn="auto" latinLnBrk="0" hangingPunct="1">
+              <a:lnSpc>
+                <a:spcPct val="100000"/>
+              </a:lnSpc>
+              <a:spcBef>
+                <a:spcPts val="0"/>
+              </a:spcBef>
+              <a:spcAft>
+                <a:spcPts val="0"/>
+              </a:spcAft>
+              <a:buClrTx/>
+              <a:buSzTx/>
+              <a:buFontTx/>
+              <a:buNone/>
+              <a:tabLst/>
+              <a:defRPr/>
+            </a:pPr>
+            <a:r>
+              <a:rPr lang="en-US" sz="1200" baseline="0" dirty="0" smtClean="0"/>
+              <a:t>And in app.js</a:t>
+            </a:r>
+            <a:endParaRPr lang="en-US" sz="1200" dirty="0" smtClean="0"/>
           </a:p>
           <a:p>
             <a:endParaRPr lang="en-US" dirty="0"/>
@@ -2218,7 +2168,7 @@
           <a:p>
             <a:fld id="{B1206FEA-4AFC-4465-8ABD-ECC3D411179B}" type="slidenum">
               <a:rPr lang="en-US" smtClean="0"/>
-              <a:t>29</a:t>
+              <a:t>28</a:t>
             </a:fld>
             <a:endParaRPr lang="en-US"/>
           </a:p>
@@ -2227,7 +2177,7 @@
     </p:spTree>
     <p:extLst>
       <p:ext uri="{BB962C8B-B14F-4D97-AF65-F5344CB8AC3E}">
-        <p14:creationId xmlns:p14="http://schemas.microsoft.com/office/powerpoint/2010/main" val="3969333674"/>
+        <p14:creationId xmlns:p14="http://schemas.microsoft.com/office/powerpoint/2010/main" val="2837921313"/>
       </p:ext>
     </p:extLst>
   </p:cSld>
@@ -2452,51 +2402,52 @@
           <a:p>
             <a:r>
               <a:rPr lang="en-US" dirty="0" smtClean="0"/>
-              <a:t>So far we use just the require</a:t>
-            </a:r>
-            <a:r>
-              <a:rPr lang="en-US" baseline="0" dirty="0" smtClean="0"/>
-              <a:t> method of Node but we are actually making the client app</a:t>
-            </a:r>
-          </a:p>
-          <a:p>
-            <a:endParaRPr lang="en-US" baseline="0" dirty="0" smtClean="0"/>
-          </a:p>
-          <a:p>
-            <a:r>
-              <a:rPr lang="en-US" baseline="0" dirty="0" err="1" smtClean="0"/>
-              <a:t>Browserify</a:t>
-            </a:r>
-            <a:r>
-              <a:rPr lang="en-US" baseline="0" dirty="0" smtClean="0"/>
-              <a:t> will let us able to use the node style code and bundles it up into on </a:t>
-            </a:r>
-            <a:r>
-              <a:rPr lang="en-US" baseline="0" dirty="0" err="1" smtClean="0"/>
-              <a:t>js</a:t>
-            </a:r>
-            <a:r>
-              <a:rPr lang="en-US" baseline="0" dirty="0" smtClean="0"/>
-              <a:t> file</a:t>
-            </a:r>
-          </a:p>
-          <a:p>
-            <a:endParaRPr lang="en-US" baseline="0" dirty="0" smtClean="0"/>
-          </a:p>
-          <a:p>
-            <a:r>
-              <a:rPr lang="en-US" baseline="0" dirty="0" smtClean="0"/>
-              <a:t>So we can use the </a:t>
-            </a:r>
-            <a:r>
-              <a:rPr lang="en-US" baseline="0" dirty="0" err="1" smtClean="0"/>
+              <a:t>So far we use just the </a:t>
+            </a:r>
+            <a:r>
+              <a:rPr lang="en-US" dirty="0" err="1" smtClean="0"/>
+              <a:t>jsx</a:t>
+            </a:r>
+            <a:r>
+              <a:rPr lang="en-US" dirty="0" smtClean="0"/>
+              <a:t> syntax in our component and also used the ES6 features in the stores.</a:t>
+            </a:r>
+          </a:p>
+          <a:p>
+            <a:r>
+              <a:rPr lang="en-US" dirty="0" smtClean="0"/>
+              <a:t>Browser don’t knows the </a:t>
+            </a:r>
+            <a:r>
+              <a:rPr lang="en-US" dirty="0" err="1" smtClean="0"/>
+              <a:t>jsx</a:t>
+            </a:r>
+            <a:r>
+              <a:rPr lang="en-US" dirty="0" smtClean="0"/>
+              <a:t> syntax in </a:t>
+            </a:r>
+            <a:r>
+              <a:rPr lang="en-US" dirty="0" err="1" smtClean="0"/>
+              <a:t>javascript</a:t>
+            </a:r>
+            <a:r>
+              <a:rPr lang="en-US" dirty="0" smtClean="0"/>
+              <a:t> so we need some transformer utility that transform this syntax to plain script for browser to digest.</a:t>
+            </a:r>
+          </a:p>
+          <a:p>
+            <a:r>
+              <a:rPr lang="en-US" dirty="0" smtClean="0"/>
+              <a:t>Babel.js done this job pretty well this can be use directly by linking its script file or using </a:t>
+            </a:r>
+            <a:r>
+              <a:rPr lang="en-US" dirty="0" err="1" smtClean="0"/>
               <a:t>npm</a:t>
             </a:r>
             <a:r>
-              <a:rPr lang="en-US" baseline="0" dirty="0" smtClean="0"/>
-              <a:t> packages and modular approach for client code designing as well</a:t>
-            </a:r>
-            <a:endParaRPr lang="en-US" dirty="0" smtClean="0"/>
+              <a:rPr lang="en-US" dirty="0" smtClean="0"/>
+              <a:t>. </a:t>
+            </a:r>
           </a:p>
           <a:p>
             <a:endParaRPr lang="en-US" dirty="0"/>
@@ -2543,7 +2494,7 @@
           <a:p>
             <a:fld id="{B1206FEA-4AFC-4465-8ABD-ECC3D411179B}" type="slidenum">
               <a:rPr lang="en-US" smtClean="0"/>
-              <a:t>30</a:t>
+              <a:t>29</a:t>
             </a:fld>
             <a:endParaRPr lang="en-US"/>
           </a:p>
@@ -2552,7 +2503,7 @@
     </p:spTree>
     <p:extLst>
       <p:ext uri="{BB962C8B-B14F-4D97-AF65-F5344CB8AC3E}">
-        <p14:creationId xmlns:p14="http://schemas.microsoft.com/office/powerpoint/2010/main" val="2079015888"/>
+        <p14:creationId xmlns:p14="http://schemas.microsoft.com/office/powerpoint/2010/main" val="3969333674"/>
       </p:ext>
     </p:extLst>
   </p:cSld>
@@ -2607,42 +2558,54 @@
           <a:lstStyle/>
           <a:p>
             <a:r>
-              <a:rPr lang="en-US" sz="1200" dirty="0" smtClean="0"/>
-              <a:t>Put the following configuration in </a:t>
-            </a:r>
-            <a:r>
-              <a:rPr lang="en-US" sz="1200" dirty="0" err="1" smtClean="0"/>
-              <a:t>package.json</a:t>
-            </a:r>
-            <a:r>
-              <a:rPr lang="en-US" sz="1200" dirty="0" smtClean="0"/>
-              <a:t> which contains all the required dependencies. </a:t>
-            </a:r>
-          </a:p>
-          <a:p>
-            <a:endParaRPr lang="en-US" sz="1200" dirty="0" smtClean="0"/>
-          </a:p>
-          <a:p>
-            <a:r>
-              <a:rPr lang="en-US" sz="1200" dirty="0" smtClean="0"/>
-              <a:t>Then use the commands “</a:t>
-            </a:r>
-            <a:r>
-              <a:rPr lang="en-US" sz="1200" dirty="0" err="1" smtClean="0"/>
+              <a:rPr lang="en-US" dirty="0" smtClean="0"/>
+              <a:t>So far we use just the require</a:t>
+            </a:r>
+            <a:r>
+              <a:rPr lang="en-US" baseline="0" dirty="0" smtClean="0"/>
+              <a:t> method of Node but we are actually making the client app</a:t>
+            </a:r>
+          </a:p>
+          <a:p>
+            <a:endParaRPr lang="en-US" baseline="0" dirty="0" smtClean="0"/>
+          </a:p>
+          <a:p>
+            <a:r>
+              <a:rPr lang="en-US" baseline="0" dirty="0" err="1" smtClean="0"/>
+              <a:t>Browserify</a:t>
+            </a:r>
+            <a:r>
+              <a:rPr lang="en-US" baseline="0" dirty="0" smtClean="0"/>
+              <a:t> will let us able to use the node style code and bundles it up into on </a:t>
+            </a:r>
+            <a:r>
+              <a:rPr lang="en-US" baseline="0" dirty="0" err="1" smtClean="0"/>
+              <a:t>js</a:t>
+            </a:r>
+            <a:r>
+              <a:rPr lang="en-US" baseline="0" dirty="0" smtClean="0"/>
+              <a:t> file</a:t>
+            </a:r>
+          </a:p>
+          <a:p>
+            <a:endParaRPr lang="en-US" baseline="0" dirty="0" smtClean="0"/>
+          </a:p>
+          <a:p>
+            <a:r>
+              <a:rPr lang="en-US" baseline="0" dirty="0" smtClean="0"/>
+              <a:t>So we can use the </a:t>
+            </a:r>
+            <a:r>
+              <a:rPr lang="en-US" baseline="0" dirty="0" err="1" smtClean="0"/>
               <a:t>npm</a:t>
             </a:r>
             <a:r>
-              <a:rPr lang="en-US" sz="1200" dirty="0" smtClean="0"/>
-              <a:t> install” and “</a:t>
-            </a:r>
-            <a:r>
-              <a:rPr lang="en-US" sz="1200" dirty="0" err="1" smtClean="0"/>
-              <a:t>npm</a:t>
-            </a:r>
-            <a:r>
-              <a:rPr lang="en-US" sz="1200" dirty="0" smtClean="0"/>
-              <a:t> run build” to install the required dependencies and build the code </a:t>
-            </a:r>
+              <a:rPr lang="en-US" baseline="0" dirty="0" smtClean="0"/>
+              <a:t> packages and modular approach for client code designing as well</a:t>
+            </a:r>
+            <a:endParaRPr lang="en-US" dirty="0" smtClean="0"/>
+          </a:p>
+          <a:p>
             <a:endParaRPr lang="en-US" dirty="0"/>
           </a:p>
         </p:txBody>
@@ -2687,7 +2650,7 @@
           <a:p>
             <a:fld id="{B1206FEA-4AFC-4465-8ABD-ECC3D411179B}" type="slidenum">
               <a:rPr lang="en-US" smtClean="0"/>
-              <a:t>31</a:t>
+              <a:t>30</a:t>
             </a:fld>
             <a:endParaRPr lang="en-US"/>
           </a:p>
@@ -2696,7 +2659,7 @@
     </p:spTree>
     <p:extLst>
       <p:ext uri="{BB962C8B-B14F-4D97-AF65-F5344CB8AC3E}">
-        <p14:creationId xmlns:p14="http://schemas.microsoft.com/office/powerpoint/2010/main" val="527664236"/>
+        <p14:creationId xmlns:p14="http://schemas.microsoft.com/office/powerpoint/2010/main" val="2079015888"/>
       </p:ext>
     </p:extLst>
   </p:cSld>
@@ -2752,38 +2715,40 @@
           <a:p>
             <a:r>
               <a:rPr lang="en-US" sz="1200" dirty="0" smtClean="0"/>
-              <a:t>To make the app SPA using hash routes we will use react-router</a:t>
-            </a:r>
-            <a:r>
-              <a:rPr lang="en-US" sz="1200" baseline="0" dirty="0" smtClean="0"/>
-              <a:t> component</a:t>
-            </a:r>
-          </a:p>
-          <a:p>
-            <a:r>
-              <a:rPr lang="en-US" dirty="0" smtClean="0"/>
-              <a:t>https://github.com/rackt/react-router</a:t>
-            </a:r>
-          </a:p>
-          <a:p>
-            <a:endParaRPr lang="en-US" dirty="0" smtClean="0"/>
-          </a:p>
-          <a:p>
-            <a:r>
-              <a:rPr lang="en-US" dirty="0" smtClean="0"/>
-              <a:t>Add</a:t>
-            </a:r>
-            <a:r>
-              <a:rPr lang="en-US" baseline="0" dirty="0" smtClean="0"/>
-              <a:t> react-router dependency and run “</a:t>
-            </a:r>
-            <a:r>
-              <a:rPr lang="en-US" baseline="0" dirty="0" err="1" smtClean="0"/>
+              <a:t>Put the following configuration in </a:t>
+            </a:r>
+            <a:r>
+              <a:rPr lang="en-US" sz="1200" dirty="0" err="1" smtClean="0"/>
+              <a:t>package.json</a:t>
+            </a:r>
+            <a:r>
+              <a:rPr lang="en-US" sz="1200" dirty="0" smtClean="0"/>
+              <a:t> which contains all the required dependencies. </a:t>
+            </a:r>
+          </a:p>
+          <a:p>
+            <a:endParaRPr lang="en-US" sz="1200" dirty="0" smtClean="0"/>
+          </a:p>
+          <a:p>
+            <a:r>
+              <a:rPr lang="en-US" sz="1200" dirty="0" smtClean="0"/>
+              <a:t>Then use the commands “</a:t>
+            </a:r>
+            <a:r>
+              <a:rPr lang="en-US" sz="1200" dirty="0" err="1" smtClean="0"/>
               <a:t>npm</a:t>
             </a:r>
             <a:r>
-              <a:rPr lang="en-US" baseline="0" dirty="0" smtClean="0"/>
-              <a:t> install” command</a:t>
+              <a:rPr lang="en-US" sz="1200" dirty="0" smtClean="0"/>
+              <a:t> install” and “</a:t>
+            </a:r>
+            <a:r>
+              <a:rPr lang="en-US" sz="1200" dirty="0" err="1" smtClean="0"/>
+              <a:t>npm</a:t>
+            </a:r>
+            <a:r>
+              <a:rPr lang="en-US" sz="1200" dirty="0" smtClean="0"/>
+              <a:t> run build” to install the required dependencies and build the code </a:t>
             </a:r>
             <a:endParaRPr lang="en-US" dirty="0"/>
           </a:p>
@@ -2829,7 +2794,7 @@
           <a:p>
             <a:fld id="{B1206FEA-4AFC-4465-8ABD-ECC3D411179B}" type="slidenum">
               <a:rPr lang="en-US" smtClean="0"/>
-              <a:t>33</a:t>
+              <a:t>31</a:t>
             </a:fld>
             <a:endParaRPr lang="en-US"/>
           </a:p>
@@ -2838,7 +2803,7 @@
     </p:spTree>
     <p:extLst>
       <p:ext uri="{BB962C8B-B14F-4D97-AF65-F5344CB8AC3E}">
-        <p14:creationId xmlns:p14="http://schemas.microsoft.com/office/powerpoint/2010/main" val="2039934366"/>
+        <p14:creationId xmlns:p14="http://schemas.microsoft.com/office/powerpoint/2010/main" val="527664236"/>
       </p:ext>
     </p:extLst>
   </p:cSld>
@@ -2971,7 +2936,7 @@
           <a:p>
             <a:fld id="{B1206FEA-4AFC-4465-8ABD-ECC3D411179B}" type="slidenum">
               <a:rPr lang="en-US" smtClean="0"/>
-              <a:t>34</a:t>
+              <a:t>33</a:t>
             </a:fld>
             <a:endParaRPr lang="en-US"/>
           </a:p>
@@ -2980,7 +2945,7 @@
     </p:spTree>
     <p:extLst>
       <p:ext uri="{BB962C8B-B14F-4D97-AF65-F5344CB8AC3E}">
-        <p14:creationId xmlns:p14="http://schemas.microsoft.com/office/powerpoint/2010/main" val="906655533"/>
+        <p14:creationId xmlns:p14="http://schemas.microsoft.com/office/powerpoint/2010/main" val="2039934366"/>
       </p:ext>
     </p:extLst>
   </p:cSld>
@@ -3113,6 +3078,148 @@
           <a:p>
             <a:fld id="{B1206FEA-4AFC-4465-8ABD-ECC3D411179B}" type="slidenum">
               <a:rPr lang="en-US" smtClean="0"/>
+              <a:t>34</a:t>
+            </a:fld>
+            <a:endParaRPr lang="en-US"/>
+          </a:p>
+        </p:txBody>
+      </p:sp>
+    </p:spTree>
+    <p:extLst>
+      <p:ext uri="{BB962C8B-B14F-4D97-AF65-F5344CB8AC3E}">
+        <p14:creationId xmlns:p14="http://schemas.microsoft.com/office/powerpoint/2010/main" val="906655533"/>
+      </p:ext>
+    </p:extLst>
+  </p:cSld>
+  <p:clrMapOvr>
+    <a:masterClrMapping/>
+  </p:clrMapOvr>
+</p:notes>
+</file>
+
+<file path=ppt/notesSlides/notesSlide25.xml><?xml version="1.0" encoding="utf-8"?>
+<p:notes xmlns:a="http://schemas.openxmlformats.org/drawingml/2006/main" xmlns:r="http://schemas.openxmlformats.org/officeDocument/2006/relationships" xmlns:p="http://schemas.openxmlformats.org/presentationml/2006/main">
+  <p:cSld>
+    <p:spTree>
+      <p:nvGrpSpPr>
+        <p:cNvPr id="1" name=""/>
+        <p:cNvGrpSpPr/>
+        <p:nvPr/>
+      </p:nvGrpSpPr>
+      <p:grpSpPr>
+        <a:xfrm>
+          <a:off x="0" y="0"/>
+          <a:ext cx="0" cy="0"/>
+          <a:chOff x="0" y="0"/>
+          <a:chExt cx="0" cy="0"/>
+        </a:xfrm>
+      </p:grpSpPr>
+      <p:sp>
+        <p:nvSpPr>
+          <p:cNvPr id="2" name="Slide Image Placeholder 1"/>
+          <p:cNvSpPr>
+            <a:spLocks noGrp="1" noRot="1" noChangeAspect="1"/>
+          </p:cNvSpPr>
+          <p:nvPr>
+            <p:ph type="sldImg"/>
+          </p:nvPr>
+        </p:nvSpPr>
+        <p:spPr/>
+      </p:sp>
+      <p:sp>
+        <p:nvSpPr>
+          <p:cNvPr id="3" name="Notes Placeholder 2"/>
+          <p:cNvSpPr>
+            <a:spLocks noGrp="1"/>
+          </p:cNvSpPr>
+          <p:nvPr>
+            <p:ph type="body" idx="1"/>
+          </p:nvPr>
+        </p:nvSpPr>
+        <p:spPr/>
+        <p:txBody>
+          <a:bodyPr/>
+          <a:lstStyle/>
+          <a:p>
+            <a:r>
+              <a:rPr lang="en-US" sz="1200" dirty="0" smtClean="0"/>
+              <a:t>To make the app SPA using hash routes we will use react-router</a:t>
+            </a:r>
+            <a:r>
+              <a:rPr lang="en-US" sz="1200" baseline="0" dirty="0" smtClean="0"/>
+              <a:t> component</a:t>
+            </a:r>
+          </a:p>
+          <a:p>
+            <a:r>
+              <a:rPr lang="en-US" dirty="0" smtClean="0"/>
+              <a:t>https://github.com/rackt/react-router</a:t>
+            </a:r>
+          </a:p>
+          <a:p>
+            <a:endParaRPr lang="en-US" dirty="0" smtClean="0"/>
+          </a:p>
+          <a:p>
+            <a:r>
+              <a:rPr lang="en-US" dirty="0" smtClean="0"/>
+              <a:t>Add</a:t>
+            </a:r>
+            <a:r>
+              <a:rPr lang="en-US" baseline="0" dirty="0" smtClean="0"/>
+              <a:t> react-router dependency and run “</a:t>
+            </a:r>
+            <a:r>
+              <a:rPr lang="en-US" baseline="0" dirty="0" err="1" smtClean="0"/>
+              <a:t>npm</a:t>
+            </a:r>
+            <a:r>
+              <a:rPr lang="en-US" baseline="0" dirty="0" smtClean="0"/>
+              <a:t> install” command</a:t>
+            </a:r>
+            <a:endParaRPr lang="en-US" dirty="0"/>
+          </a:p>
+        </p:txBody>
+      </p:sp>
+      <p:sp>
+        <p:nvSpPr>
+          <p:cNvPr id="4" name="Header Placeholder 3"/>
+          <p:cNvSpPr>
+            <a:spLocks noGrp="1"/>
+          </p:cNvSpPr>
+          <p:nvPr>
+            <p:ph type="hdr" sz="quarter" idx="10"/>
+          </p:nvPr>
+        </p:nvSpPr>
+        <p:spPr/>
+        <p:txBody>
+          <a:bodyPr/>
+          <a:lstStyle/>
+          <a:p>
+            <a:r>
+              <a:rPr lang="en-US" smtClean="0"/>
+              <a:t>TEST</a:t>
+            </a:r>
+            <a:endParaRPr lang="en-US"/>
+          </a:p>
+        </p:txBody>
+      </p:sp>
+      <p:sp>
+        <p:nvSpPr>
+          <p:cNvPr id="5" name="Slide Number Placeholder 4"/>
+          <p:cNvSpPr>
+            <a:spLocks noGrp="1"/>
+          </p:cNvSpPr>
+          <p:nvPr>
+            <p:ph type="sldNum" sz="quarter" idx="11"/>
+          </p:nvPr>
+        </p:nvSpPr>
+        <p:spPr/>
+        <p:txBody>
+          <a:bodyPr/>
+          <a:lstStyle/>
+          <a:p>
+            <a:fld id="{B1206FEA-4AFC-4465-8ABD-ECC3D411179B}" type="slidenum">
+              <a:rPr lang="en-US" smtClean="0"/>
               <a:t>35</a:t>
             </a:fld>
             <a:endParaRPr lang="en-US"/>
@@ -3132,7 +3239,7 @@
 </p:notes>
 </file>
 
-<file path=ppt/notesSlides/notesSlide25.xml><?xml version="1.0" encoding="utf-8"?>
+<file path=ppt/notesSlides/notesSlide26.xml><?xml version="1.0" encoding="utf-8"?>
 <p:notes xmlns:a="http://schemas.openxmlformats.org/drawingml/2006/main" xmlns:r="http://schemas.openxmlformats.org/officeDocument/2006/relationships" xmlns:p="http://schemas.openxmlformats.org/presentationml/2006/main">
   <p:cSld>
     <p:spTree>
@@ -3949,15 +4056,7 @@
           <a:p>
             <a:r>
               <a:rPr lang="en-US" dirty="0" smtClean="0"/>
-              <a:t>In which all our </a:t>
-            </a:r>
-            <a:r>
-              <a:rPr lang="en-US" dirty="0" err="1" smtClean="0"/>
-              <a:t>Js</a:t>
-            </a:r>
-            <a:r>
-              <a:rPr lang="en-US" dirty="0" smtClean="0"/>
-              <a:t> code resides in the </a:t>
+              <a:t>In which all our Js code resides in the </a:t>
             </a:r>
             <a:r>
               <a:rPr lang="en-US" dirty="0" err="1" smtClean="0"/>
@@ -4335,7 +4434,7 @@
           <a:p>
             <a:fld id="{303EB834-E7B8-409E-81B9-982E8459DCCC}" type="datetime1">
               <a:rPr lang="en-US" smtClean="0"/>
-              <a:t>12/31/2015</a:t>
+              <a:t>1/1/2016</a:t>
             </a:fld>
             <a:endParaRPr lang="en-US"/>
           </a:p>
@@ -4505,7 +4604,7 @@
           <a:p>
             <a:fld id="{F19D2895-FC19-48B1-B748-C2413DEA71C1}" type="datetime1">
               <a:rPr lang="en-US" smtClean="0"/>
-              <a:t>12/31/2015</a:t>
+              <a:t>1/1/2016</a:t>
             </a:fld>
             <a:endParaRPr lang="en-US"/>
           </a:p>
@@ -4685,7 +4784,7 @@
           <a:p>
             <a:fld id="{96A00C3C-F0B8-47F0-94A4-AC32EEBC5F82}" type="datetime1">
               <a:rPr lang="en-US" smtClean="0"/>
-              <a:t>12/31/2015</a:t>
+              <a:t>1/1/2016</a:t>
             </a:fld>
             <a:endParaRPr lang="en-US"/>
           </a:p>
@@ -5468,7 +5567,7 @@
           <a:p>
             <a:fld id="{303EB834-E7B8-409E-81B9-982E8459DCCC}" type="datetime1">
               <a:rPr lang="en-US" smtClean="0"/>
-              <a:t>12/31/2015</a:t>
+              <a:t>1/1/2016</a:t>
             </a:fld>
             <a:endParaRPr lang="en-US"/>
           </a:p>
@@ -5644,7 +5743,7 @@
           <a:p>
             <a:fld id="{06D12459-9C40-4044-BF33-9A5B25D48414}" type="datetime1">
               <a:rPr lang="en-US" smtClean="0"/>
-              <a:t>12/31/2015</a:t>
+              <a:t>1/1/2016</a:t>
             </a:fld>
             <a:endParaRPr lang="en-US"/>
           </a:p>
@@ -5891,7 +5990,7 @@
           <a:p>
             <a:fld id="{2E08FAB6-119E-4576-8D09-082504E83A1B}" type="datetime1">
               <a:rPr lang="en-US" smtClean="0"/>
-              <a:t>12/31/2015</a:t>
+              <a:t>1/1/2016</a:t>
             </a:fld>
             <a:endParaRPr lang="en-US"/>
           </a:p>
@@ -6123,7 +6222,7 @@
           <a:p>
             <a:fld id="{539674DB-8137-4B07-9101-81EA67E66245}" type="datetime1">
               <a:rPr lang="en-US" smtClean="0"/>
-              <a:t>12/31/2015</a:t>
+              <a:t>1/1/2016</a:t>
             </a:fld>
             <a:endParaRPr lang="en-US"/>
           </a:p>
@@ -6497,7 +6596,7 @@
           <a:p>
             <a:fld id="{E04C8895-3746-40DA-994F-BCAD26497945}" type="datetime1">
               <a:rPr lang="en-US" smtClean="0"/>
-              <a:t>12/31/2015</a:t>
+              <a:t>1/1/2016</a:t>
             </a:fld>
             <a:endParaRPr lang="en-US"/>
           </a:p>
@@ -6620,7 +6719,7 @@
           <a:p>
             <a:fld id="{475C878A-3BFB-4C42-913C-C7DB5AC5AA08}" type="datetime1">
               <a:rPr lang="en-US" smtClean="0"/>
-              <a:t>12/31/2015</a:t>
+              <a:t>1/1/2016</a:t>
             </a:fld>
             <a:endParaRPr lang="en-US"/>
           </a:p>
@@ -6715,7 +6814,7 @@
           <a:p>
             <a:fld id="{B1C4F552-6897-43BC-846A-656636E3EE1D}" type="datetime1">
               <a:rPr lang="en-US" smtClean="0"/>
-              <a:t>12/31/2015</a:t>
+              <a:t>1/1/2016</a:t>
             </a:fld>
             <a:endParaRPr lang="en-US"/>
           </a:p>
@@ -6970,7 +7069,7 @@
           <a:p>
             <a:fld id="{71A41344-2947-41F1-905A-FD4B8381B313}" type="datetime1">
               <a:rPr lang="en-US" smtClean="0"/>
-              <a:t>12/31/2015</a:t>
+              <a:t>1/1/2016</a:t>
             </a:fld>
             <a:endParaRPr lang="en-US"/>
           </a:p>
@@ -7140,7 +7239,7 @@
           <a:p>
             <a:fld id="{06D12459-9C40-4044-BF33-9A5B25D48414}" type="datetime1">
               <a:rPr lang="en-US" smtClean="0"/>
-              <a:t>12/31/2015</a:t>
+              <a:t>1/1/2016</a:t>
             </a:fld>
             <a:endParaRPr lang="en-US"/>
           </a:p>
@@ -7403,7 +7502,7 @@
           <a:p>
             <a:fld id="{4DC85097-E5CA-4C93-85D6-E09D69C5520C}" type="datetime1">
               <a:rPr lang="en-US" smtClean="0"/>
-              <a:t>12/31/2015</a:t>
+              <a:t>1/1/2016</a:t>
             </a:fld>
             <a:endParaRPr lang="en-US"/>
           </a:p>
@@ -7654,7 +7753,7 @@
           <a:p>
             <a:fld id="{B32A9C83-92CC-43F7-A504-00D1A2E6CB6D}" type="datetime1">
               <a:rPr lang="en-US" smtClean="0"/>
-              <a:t>12/31/2015</a:t>
+              <a:t>1/1/2016</a:t>
             </a:fld>
             <a:endParaRPr lang="en-US"/>
           </a:p>
@@ -7969,7 +8068,7 @@
           <a:p>
             <a:fld id="{B32A9C83-92CC-43F7-A504-00D1A2E6CB6D}" type="datetime1">
               <a:rPr lang="en-US" smtClean="0"/>
-              <a:t>12/31/2015</a:t>
+              <a:t>1/1/2016</a:t>
             </a:fld>
             <a:endParaRPr lang="en-US"/>
           </a:p>
@@ -8311,7 +8410,7 @@
           <a:p>
             <a:fld id="{B32A9C83-92CC-43F7-A504-00D1A2E6CB6D}" type="datetime1">
               <a:rPr lang="en-US" smtClean="0"/>
-              <a:t>12/31/2015</a:t>
+              <a:t>1/1/2016</a:t>
             </a:fld>
             <a:endParaRPr lang="en-US"/>
           </a:p>
@@ -8626,7 +8725,7 @@
           <a:p>
             <a:fld id="{B32A9C83-92CC-43F7-A504-00D1A2E6CB6D}" type="datetime1">
               <a:rPr lang="en-US" smtClean="0"/>
-              <a:t>12/31/2015</a:t>
+              <a:t>1/1/2016</a:t>
             </a:fld>
             <a:endParaRPr lang="en-US"/>
           </a:p>
@@ -9020,7 +9119,7 @@
           <a:p>
             <a:fld id="{B32A9C83-92CC-43F7-A504-00D1A2E6CB6D}" type="datetime1">
               <a:rPr lang="en-US" smtClean="0"/>
-              <a:t>12/31/2015</a:t>
+              <a:t>1/1/2016</a:t>
             </a:fld>
             <a:endParaRPr lang="en-US"/>
           </a:p>
@@ -9191,7 +9290,7 @@
           <a:p>
             <a:fld id="{F19D2895-FC19-48B1-B748-C2413DEA71C1}" type="datetime1">
               <a:rPr lang="en-US" smtClean="0"/>
-              <a:t>12/31/2015</a:t>
+              <a:t>1/1/2016</a:t>
             </a:fld>
             <a:endParaRPr lang="en-US"/>
           </a:p>
@@ -9371,7 +9470,7 @@
           <a:p>
             <a:fld id="{96A00C3C-F0B8-47F0-94A4-AC32EEBC5F82}" type="datetime1">
               <a:rPr lang="en-US" smtClean="0"/>
-              <a:t>12/31/2015</a:t>
+              <a:t>1/1/2016</a:t>
             </a:fld>
             <a:endParaRPr lang="en-US"/>
           </a:p>
@@ -10154,7 +10253,7 @@
           <a:p>
             <a:fld id="{303EB834-E7B8-409E-81B9-982E8459DCCC}" type="datetime1">
               <a:rPr lang="en-US" smtClean="0"/>
-              <a:t>12/31/2015</a:t>
+              <a:t>1/1/2016</a:t>
             </a:fld>
             <a:endParaRPr lang="en-US"/>
           </a:p>
@@ -10330,7 +10429,7 @@
           <a:p>
             <a:fld id="{06D12459-9C40-4044-BF33-9A5B25D48414}" type="datetime1">
               <a:rPr lang="en-US" smtClean="0"/>
-              <a:t>12/31/2015</a:t>
+              <a:t>1/1/2016</a:t>
             </a:fld>
             <a:endParaRPr lang="en-US"/>
           </a:p>
@@ -10576,7 +10675,7 @@
           <a:p>
             <a:fld id="{2E08FAB6-119E-4576-8D09-082504E83A1B}" type="datetime1">
               <a:rPr lang="en-US" smtClean="0"/>
-              <a:t>12/31/2015</a:t>
+              <a:t>1/1/2016</a:t>
             </a:fld>
             <a:endParaRPr lang="en-US"/>
           </a:p>
@@ -10823,7 +10922,7 @@
           <a:p>
             <a:fld id="{2E08FAB6-119E-4576-8D09-082504E83A1B}" type="datetime1">
               <a:rPr lang="en-US" smtClean="0"/>
-              <a:t>12/31/2015</a:t>
+              <a:t>1/1/2016</a:t>
             </a:fld>
             <a:endParaRPr lang="en-US"/>
           </a:p>
@@ -11055,7 +11154,7 @@
           <a:p>
             <a:fld id="{539674DB-8137-4B07-9101-81EA67E66245}" type="datetime1">
               <a:rPr lang="en-US" smtClean="0"/>
-              <a:t>12/31/2015</a:t>
+              <a:t>1/1/2016</a:t>
             </a:fld>
             <a:endParaRPr lang="en-US"/>
           </a:p>
@@ -11429,7 +11528,7 @@
           <a:p>
             <a:fld id="{E04C8895-3746-40DA-994F-BCAD26497945}" type="datetime1">
               <a:rPr lang="en-US" smtClean="0"/>
-              <a:t>12/31/2015</a:t>
+              <a:t>1/1/2016</a:t>
             </a:fld>
             <a:endParaRPr lang="en-US"/>
           </a:p>
@@ -11552,7 +11651,7 @@
           <a:p>
             <a:fld id="{475C878A-3BFB-4C42-913C-C7DB5AC5AA08}" type="datetime1">
               <a:rPr lang="en-US" smtClean="0"/>
-              <a:t>12/31/2015</a:t>
+              <a:t>1/1/2016</a:t>
             </a:fld>
             <a:endParaRPr lang="en-US"/>
           </a:p>
@@ -11647,7 +11746,7 @@
           <a:p>
             <a:fld id="{B1C4F552-6897-43BC-846A-656636E3EE1D}" type="datetime1">
               <a:rPr lang="en-US" smtClean="0"/>
-              <a:t>12/31/2015</a:t>
+              <a:t>1/1/2016</a:t>
             </a:fld>
             <a:endParaRPr lang="en-US"/>
           </a:p>
@@ -11902,7 +12001,7 @@
           <a:p>
             <a:fld id="{71A41344-2947-41F1-905A-FD4B8381B313}" type="datetime1">
               <a:rPr lang="en-US" smtClean="0"/>
-              <a:t>12/31/2015</a:t>
+              <a:t>1/1/2016</a:t>
             </a:fld>
             <a:endParaRPr lang="en-US"/>
           </a:p>
@@ -12165,7 +12264,7 @@
           <a:p>
             <a:fld id="{4DC85097-E5CA-4C93-85D6-E09D69C5520C}" type="datetime1">
               <a:rPr lang="en-US" smtClean="0"/>
-              <a:t>12/31/2015</a:t>
+              <a:t>1/1/2016</a:t>
             </a:fld>
             <a:endParaRPr lang="en-US"/>
           </a:p>
@@ -12416,7 +12515,7 @@
           <a:p>
             <a:fld id="{B32A9C83-92CC-43F7-A504-00D1A2E6CB6D}" type="datetime1">
               <a:rPr lang="en-US" smtClean="0"/>
-              <a:t>12/31/2015</a:t>
+              <a:t>1/1/2016</a:t>
             </a:fld>
             <a:endParaRPr lang="en-US"/>
           </a:p>
@@ -12731,7 +12830,7 @@
           <a:p>
             <a:fld id="{B32A9C83-92CC-43F7-A504-00D1A2E6CB6D}" type="datetime1">
               <a:rPr lang="en-US" smtClean="0"/>
-              <a:t>12/31/2015</a:t>
+              <a:t>1/1/2016</a:t>
             </a:fld>
             <a:endParaRPr lang="en-US"/>
           </a:p>
@@ -13073,7 +13172,7 @@
           <a:p>
             <a:fld id="{B32A9C83-92CC-43F7-A504-00D1A2E6CB6D}" type="datetime1">
               <a:rPr lang="en-US" smtClean="0"/>
-              <a:t>12/31/2015</a:t>
+              <a:t>1/1/2016</a:t>
             </a:fld>
             <a:endParaRPr lang="en-US"/>
           </a:p>
@@ -13306,7 +13405,7 @@
           <a:p>
             <a:fld id="{539674DB-8137-4B07-9101-81EA67E66245}" type="datetime1">
               <a:rPr lang="en-US" smtClean="0"/>
-              <a:t>12/31/2015</a:t>
+              <a:t>1/1/2016</a:t>
             </a:fld>
             <a:endParaRPr lang="en-US"/>
           </a:p>
@@ -13620,7 +13719,7 @@
           <a:p>
             <a:fld id="{B32A9C83-92CC-43F7-A504-00D1A2E6CB6D}" type="datetime1">
               <a:rPr lang="en-US" smtClean="0"/>
-              <a:t>12/31/2015</a:t>
+              <a:t>1/1/2016</a:t>
             </a:fld>
             <a:endParaRPr lang="en-US"/>
           </a:p>
@@ -14014,7 +14113,7 @@
           <a:p>
             <a:fld id="{B32A9C83-92CC-43F7-A504-00D1A2E6CB6D}" type="datetime1">
               <a:rPr lang="en-US" smtClean="0"/>
-              <a:t>12/31/2015</a:t>
+              <a:t>1/1/2016</a:t>
             </a:fld>
             <a:endParaRPr lang="en-US"/>
           </a:p>
@@ -14185,7 +14284,7 @@
           <a:p>
             <a:fld id="{F19D2895-FC19-48B1-B748-C2413DEA71C1}" type="datetime1">
               <a:rPr lang="en-US" smtClean="0"/>
-              <a:t>12/31/2015</a:t>
+              <a:t>1/1/2016</a:t>
             </a:fld>
             <a:endParaRPr lang="en-US"/>
           </a:p>
@@ -14365,7 +14464,7 @@
           <a:p>
             <a:fld id="{96A00C3C-F0B8-47F0-94A4-AC32EEBC5F82}" type="datetime1">
               <a:rPr lang="en-US" smtClean="0"/>
-              <a:t>12/31/2015</a:t>
+              <a:t>1/1/2016</a:t>
             </a:fld>
             <a:endParaRPr lang="en-US"/>
           </a:p>
@@ -14732,7 +14831,7 @@
           <a:p>
             <a:fld id="{E04C8895-3746-40DA-994F-BCAD26497945}" type="datetime1">
               <a:rPr lang="en-US" smtClean="0"/>
-              <a:t>12/31/2015</a:t>
+              <a:t>1/1/2016</a:t>
             </a:fld>
             <a:endParaRPr lang="en-US"/>
           </a:p>
@@ -14850,7 +14949,7 @@
           <a:p>
             <a:fld id="{475C878A-3BFB-4C42-913C-C7DB5AC5AA08}" type="datetime1">
               <a:rPr lang="en-US" smtClean="0"/>
-              <a:t>12/31/2015</a:t>
+              <a:t>1/1/2016</a:t>
             </a:fld>
             <a:endParaRPr lang="en-US"/>
           </a:p>
@@ -14945,7 +15044,7 @@
           <a:p>
             <a:fld id="{B1C4F552-6897-43BC-846A-656636E3EE1D}" type="datetime1">
               <a:rPr lang="en-US" smtClean="0"/>
-              <a:t>12/31/2015</a:t>
+              <a:t>1/1/2016</a:t>
             </a:fld>
             <a:endParaRPr lang="en-US"/>
           </a:p>
@@ -15222,7 +15321,7 @@
           <a:p>
             <a:fld id="{71A41344-2947-41F1-905A-FD4B8381B313}" type="datetime1">
               <a:rPr lang="en-US" smtClean="0"/>
-              <a:t>12/31/2015</a:t>
+              <a:t>1/1/2016</a:t>
             </a:fld>
             <a:endParaRPr lang="en-US"/>
           </a:p>
@@ -15475,7 +15574,7 @@
           <a:p>
             <a:fld id="{4DC85097-E5CA-4C93-85D6-E09D69C5520C}" type="datetime1">
               <a:rPr lang="en-US" smtClean="0"/>
-              <a:t>12/31/2015</a:t>
+              <a:t>1/1/2016</a:t>
             </a:fld>
             <a:endParaRPr lang="en-US"/>
           </a:p>
@@ -15688,7 +15787,7 @@
           <a:p>
             <a:fld id="{B32A9C83-92CC-43F7-A504-00D1A2E6CB6D}" type="datetime1">
               <a:rPr lang="en-US" smtClean="0"/>
-              <a:t>12/31/2015</a:t>
+              <a:t>1/1/2016</a:t>
             </a:fld>
             <a:endParaRPr lang="en-US"/>
           </a:p>
@@ -16759,7 +16858,7 @@
           <a:p>
             <a:fld id="{B32A9C83-92CC-43F7-A504-00D1A2E6CB6D}" type="datetime1">
               <a:rPr lang="en-US" smtClean="0"/>
-              <a:t>12/31/2015</a:t>
+              <a:t>1/1/2016</a:t>
             </a:fld>
             <a:endParaRPr lang="en-US"/>
           </a:p>
@@ -17949,7 +18048,7 @@
           <a:p>
             <a:fld id="{B32A9C83-92CC-43F7-A504-00D1A2E6CB6D}" type="datetime1">
               <a:rPr lang="en-US" smtClean="0"/>
-              <a:t>12/31/2015</a:t>
+              <a:t>1/1/2016</a:t>
             </a:fld>
             <a:endParaRPr lang="en-US"/>
           </a:p>
@@ -18809,11 +18908,7 @@
           <a:p>
             <a:r>
               <a:rPr lang="en-US" dirty="0" smtClean="0"/>
-              <a:t>Learning Alt </a:t>
-            </a:r>
-            <a:r>
-              <a:rPr lang="en-US" dirty="0" err="1" smtClean="0"/>
-              <a:t>Js</a:t>
+              <a:t>Learning Alt Js</a:t>
             </a:r>
             <a:endParaRPr lang="en-US" dirty="0"/>
           </a:p>
@@ -18979,13 +19074,8 @@
           <a:p>
             <a:r>
               <a:rPr lang="en-US" dirty="0"/>
-              <a:t>Learning Alt </a:t>
-            </a:r>
-            <a:r>
-              <a:rPr lang="en-US" dirty="0" err="1"/>
-              <a:t>Js</a:t>
-            </a:r>
-            <a:endParaRPr lang="en-US" dirty="0"/>
+              <a:t>Learning Alt Js</a:t>
+            </a:r>
           </a:p>
         </p:txBody>
       </p:sp>
@@ -19185,13 +19275,8 @@
           <a:p>
             <a:r>
               <a:rPr lang="en-US" dirty="0"/>
-              <a:t>Learning Alt </a:t>
-            </a:r>
-            <a:r>
-              <a:rPr lang="en-US" dirty="0" err="1"/>
-              <a:t>Js</a:t>
-            </a:r>
-            <a:endParaRPr lang="en-US" dirty="0"/>
+              <a:t>Learning Alt Js</a:t>
+            </a:r>
           </a:p>
         </p:txBody>
       </p:sp>
@@ -19355,13 +19440,8 @@
           <a:p>
             <a:r>
               <a:rPr lang="en-US" dirty="0"/>
-              <a:t>Learning Alt </a:t>
-            </a:r>
-            <a:r>
-              <a:rPr lang="en-US" dirty="0" err="1"/>
-              <a:t>Js</a:t>
-            </a:r>
-            <a:endParaRPr lang="en-US" dirty="0"/>
+              <a:t>Learning Alt Js</a:t>
+            </a:r>
           </a:p>
         </p:txBody>
       </p:sp>
@@ -19557,11 +19637,7 @@
           <a:p>
             <a:r>
               <a:rPr lang="en-US" dirty="0" smtClean="0"/>
-              <a:t>Learning Alt </a:t>
-            </a:r>
-            <a:r>
-              <a:rPr lang="en-US" dirty="0" err="1" smtClean="0"/>
-              <a:t>Js</a:t>
+              <a:t>Learning Alt Js</a:t>
             </a:r>
             <a:endParaRPr lang="en-US" dirty="0"/>
           </a:p>
@@ -19843,13 +19919,8 @@
           <a:p>
             <a:r>
               <a:rPr lang="en-US" dirty="0"/>
-              <a:t>Learning Alt </a:t>
-            </a:r>
-            <a:r>
-              <a:rPr lang="en-US" dirty="0" err="1"/>
-              <a:t>Js</a:t>
-            </a:r>
-            <a:endParaRPr lang="en-US" dirty="0"/>
+              <a:t>Learning Alt Js</a:t>
+            </a:r>
           </a:p>
         </p:txBody>
       </p:sp>
@@ -19960,11 +20031,7 @@
           <a:p>
             <a:r>
               <a:rPr lang="en-US" dirty="0" smtClean="0"/>
-              <a:t>Introducing React </a:t>
-            </a:r>
-            <a:r>
-              <a:rPr lang="en-US" dirty="0" err="1" smtClean="0"/>
-              <a:t>Js</a:t>
+              <a:t>Introducing React Js</a:t>
             </a:r>
             <a:endParaRPr lang="en-US" dirty="0"/>
           </a:p>
@@ -20080,11 +20147,7 @@
           <a:p>
             <a:r>
               <a:rPr lang="en-US" dirty="0" smtClean="0"/>
-              <a:t>Learning React </a:t>
-            </a:r>
-            <a:r>
-              <a:rPr lang="en-US" dirty="0" err="1" smtClean="0"/>
-              <a:t>Js</a:t>
+              <a:t>Learning React Js</a:t>
             </a:r>
             <a:endParaRPr lang="en-US" dirty="0"/>
           </a:p>
@@ -20197,13 +20260,8 @@
           <a:p>
             <a:r>
               <a:rPr lang="en-US" dirty="0"/>
-              <a:t>Introducing React </a:t>
-            </a:r>
-            <a:r>
-              <a:rPr lang="en-US" dirty="0" err="1"/>
-              <a:t>Js</a:t>
-            </a:r>
-            <a:endParaRPr lang="en-US" dirty="0"/>
+              <a:t>Introducing React Js</a:t>
+            </a:r>
           </a:p>
         </p:txBody>
       </p:sp>
@@ -20288,13 +20346,8 @@
           <a:p>
             <a:r>
               <a:rPr lang="en-US" dirty="0"/>
-              <a:t>Learning React </a:t>
-            </a:r>
-            <a:r>
-              <a:rPr lang="en-US" dirty="0" err="1"/>
-              <a:t>Js</a:t>
-            </a:r>
-            <a:endParaRPr lang="en-US" dirty="0"/>
+              <a:t>Learning React Js</a:t>
+            </a:r>
           </a:p>
         </p:txBody>
       </p:sp>
@@ -20691,13 +20744,8 @@
           <a:p>
             <a:r>
               <a:rPr lang="en-US" dirty="0"/>
-              <a:t>Learning React </a:t>
-            </a:r>
-            <a:r>
-              <a:rPr lang="en-US" dirty="0" err="1"/>
-              <a:t>Js</a:t>
-            </a:r>
-            <a:endParaRPr lang="en-US" dirty="0"/>
+              <a:t>Learning React Js</a:t>
+            </a:r>
           </a:p>
         </p:txBody>
       </p:sp>
@@ -21431,13 +21479,8 @@
           <a:p>
             <a:r>
               <a:rPr lang="en-US" dirty="0"/>
-              <a:t>Learning React </a:t>
-            </a:r>
-            <a:r>
-              <a:rPr lang="en-US" dirty="0" err="1"/>
-              <a:t>Js</a:t>
-            </a:r>
-            <a:endParaRPr lang="en-US" dirty="0"/>
+              <a:t>Learning React Js</a:t>
+            </a:r>
           </a:p>
         </p:txBody>
       </p:sp>
@@ -21646,13 +21689,8 @@
           <a:p>
             <a:r>
               <a:rPr lang="en-US" dirty="0"/>
-              <a:t>Learning React </a:t>
-            </a:r>
-            <a:r>
-              <a:rPr lang="en-US" dirty="0" err="1"/>
-              <a:t>Js</a:t>
-            </a:r>
-            <a:endParaRPr lang="en-US" dirty="0"/>
+              <a:t>Learning React Js</a:t>
+            </a:r>
           </a:p>
         </p:txBody>
       </p:sp>
@@ -21908,7 +21946,7 @@
           </p:nvPr>
         </p:nvPicPr>
         <p:blipFill>
-          <a:blip r:embed="rId2">
+          <a:blip r:embed="rId3">
             <a:extLst>
               <a:ext uri="{28A0092B-C50C-407E-A947-70E740481C1C}">
                 <a14:useLocalDpi xmlns:a14="http://schemas.microsoft.com/office/drawing/2010/main" val="0"/>
@@ -21943,13 +21981,8 @@
           <a:p>
             <a:r>
               <a:rPr lang="en-US" dirty="0"/>
-              <a:t>Learning React </a:t>
-            </a:r>
-            <a:r>
-              <a:rPr lang="en-US" dirty="0" err="1"/>
-              <a:t>Js</a:t>
-            </a:r>
-            <a:endParaRPr lang="en-US" dirty="0"/>
+              <a:t>Learning React Js</a:t>
+            </a:r>
           </a:p>
         </p:txBody>
       </p:sp>
@@ -21985,7 +22018,7 @@
           <p:nvPr/>
         </p:nvPicPr>
         <p:blipFill>
-          <a:blip r:embed="rId3">
+          <a:blip r:embed="rId4">
             <a:extLst>
               <a:ext uri="{28A0092B-C50C-407E-A947-70E740481C1C}">
                 <a14:useLocalDpi xmlns:a14="http://schemas.microsoft.com/office/drawing/2010/main" val="0"/>
@@ -22175,13 +22208,8 @@
           <a:p>
             <a:r>
               <a:rPr lang="en-US" dirty="0"/>
-              <a:t>Learning React </a:t>
-            </a:r>
-            <a:r>
-              <a:rPr lang="en-US" dirty="0" err="1"/>
-              <a:t>Js</a:t>
-            </a:r>
-            <a:endParaRPr lang="en-US" dirty="0"/>
+              <a:t>Learning React Js</a:t>
+            </a:r>
           </a:p>
         </p:txBody>
       </p:sp>
@@ -23607,8 +23635,12 @@
           <a:lstStyle/>
           <a:p>
             <a:r>
-              <a:rPr lang="en-US" smtClean="0"/>
-              <a:t>Babel Js the Transpiler</a:t>
+              <a:rPr lang="en-US" dirty="0" smtClean="0"/>
+              <a:t>Babel Js the </a:t>
+            </a:r>
+            <a:r>
+              <a:rPr lang="en-US" dirty="0" err="1" smtClean="0"/>
+              <a:t>Transpiler</a:t>
             </a:r>
             <a:endParaRPr lang="en-US" dirty="0"/>
           </a:p>
@@ -23751,7 +23783,7 @@
         </p:blipFill>
         <p:spPr>
           <a:xfrm>
-            <a:off x="1227536" y="1900545"/>
+            <a:off x="1210283" y="3255570"/>
             <a:ext cx="9453509" cy="2917404"/>
           </a:xfrm>
         </p:spPr>
@@ -23877,6 +23909,63 @@
           </a:prstGeom>
         </p:spPr>
       </p:pic>
+      <p:sp>
+        <p:nvSpPr>
+          <p:cNvPr id="8" name="Title 1"/>
+          <p:cNvSpPr txBox="1">
+            <a:spLocks/>
+          </p:cNvSpPr>
+          <p:nvPr/>
+        </p:nvSpPr>
+        <p:spPr>
+          <a:xfrm>
+            <a:off x="994453" y="1762222"/>
+            <a:ext cx="10515600" cy="1325563"/>
+          </a:xfrm>
+          <a:prstGeom prst="rect">
+            <a:avLst/>
+          </a:prstGeom>
+        </p:spPr>
+        <p:txBody>
+          <a:bodyPr vert="horz" lIns="91440" tIns="45720" rIns="91440" bIns="45720" rtlCol="0" anchor="ctr">
+            <a:normAutofit/>
+          </a:bodyPr>
+          <a:lstStyle>
+            <a:lvl1pPr algn="l" defTabSz="914400" rtl="0" eaLnBrk="1" latinLnBrk="0" hangingPunct="1">
+              <a:lnSpc>
+                <a:spcPct val="90000"/>
+              </a:lnSpc>
+              <a:spcBef>
+                <a:spcPct val="0"/>
+              </a:spcBef>
+              <a:buNone/>
+              <a:defRPr sz="4400" kern="1200">
+                <a:solidFill>
+                  <a:schemeClr val="tx1"/>
+                </a:solidFill>
+                <a:latin typeface="+mj-lt"/>
+                <a:ea typeface="+mj-ea"/>
+                <a:cs typeface="+mj-cs"/>
+              </a:defRPr>
+            </a:lvl1pPr>
+          </a:lstStyle>
+          <a:p>
+            <a:r>
+              <a:rPr lang="en-US" sz="2800" dirty="0">
+                <a:latin typeface="+mn-lt"/>
+                <a:ea typeface="+mn-ea"/>
+                <a:cs typeface="+mn-cs"/>
+              </a:rPr>
+              <a:t>Problem with Two-way binding</a:t>
+            </a:r>
+            <a:endParaRPr lang="en-US" sz="2800" dirty="0">
+              <a:latin typeface="+mn-lt"/>
+              <a:ea typeface="+mn-ea"/>
+              <a:cs typeface="+mn-cs"/>
+            </a:endParaRPr>
+          </a:p>
+        </p:txBody>
+      </p:sp>
     </p:spTree>
     <p:extLst>
       <p:ext uri="{BB962C8B-B14F-4D97-AF65-F5344CB8AC3E}">
@@ -26396,13 +26485,8 @@
           <a:p>
             <a:r>
               <a:rPr lang="en-US" dirty="0"/>
-              <a:t>Learning React </a:t>
-            </a:r>
-            <a:r>
-              <a:rPr lang="en-US" dirty="0" err="1"/>
-              <a:t>Js</a:t>
-            </a:r>
-            <a:endParaRPr lang="en-US" dirty="0"/>
+              <a:t>Learning React Js</a:t>
+            </a:r>
           </a:p>
         </p:txBody>
       </p:sp>

</xml_diff>